<commit_message>
. edit bookmark panel
</commit_message>
<xml_diff>
--- a/art/ux-design-ideas.pptx
+++ b/art/ux-design-ideas.pptx
@@ -6,9 +6,11 @@
   </p:sldMasterIdLst>
   <p:sldIdLst>
     <p:sldId id="256" r:id="rId2"/>
-    <p:sldId id="259" r:id="rId3"/>
-    <p:sldId id="258" r:id="rId4"/>
-    <p:sldId id="257" r:id="rId5"/>
+    <p:sldId id="260" r:id="rId3"/>
+    <p:sldId id="259" r:id="rId4"/>
+    <p:sldId id="261" r:id="rId5"/>
+    <p:sldId id="258" r:id="rId6"/>
+    <p:sldId id="257" r:id="rId7"/>
   </p:sldIdLst>
   <p:sldSz cx="12192000" cy="6858000"/>
   <p:notesSz cx="6858000" cy="9144000"/>
@@ -1514,76 +1516,6 @@
           </a:p>
         </p:txBody>
       </p:sp>
-      <p:pic>
-        <p:nvPicPr>
-          <p:cNvPr id="19" name="Picture 18" descr="Screen Clipping">
-            <a:extLst>
-              <a:ext uri="{FF2B5EF4-FFF2-40B4-BE49-F238E27FC236}">
-                <a16:creationId xmlns:a16="http://schemas.microsoft.com/office/drawing/2014/main" id="{9901026C-A7FB-487A-94CF-705CB218C346}"/>
-              </a:ext>
-            </a:extLst>
-          </p:cNvPr>
-          <p:cNvPicPr>
-            <a:picLocks noChangeAspect="1"/>
-          </p:cNvPicPr>
-          <p:nvPr/>
-        </p:nvPicPr>
-        <p:blipFill rotWithShape="1">
-          <a:blip r:embed="rId7">
-            <a:extLst>
-              <a:ext uri="{28A0092B-C50C-407E-A947-70E740481C1C}">
-                <a14:useLocalDpi xmlns:a14="http://schemas.microsoft.com/office/drawing/2010/main" val="0"/>
-              </a:ext>
-            </a:extLst>
-          </a:blip>
-          <a:srcRect b="5314"/>
-          <a:stretch/>
-        </p:blipFill>
-        <p:spPr>
-          <a:xfrm>
-            <a:off x="5988493" y="2890607"/>
-            <a:ext cx="1828800" cy="3439736"/>
-          </a:xfrm>
-          <a:prstGeom prst="rect">
-            <a:avLst/>
-          </a:prstGeom>
-        </p:spPr>
-      </p:pic>
-      <p:sp>
-        <p:nvSpPr>
-          <p:cNvPr id="20" name="TextBox 19">
-            <a:extLst>
-              <a:ext uri="{FF2B5EF4-FFF2-40B4-BE49-F238E27FC236}">
-                <a16:creationId xmlns:a16="http://schemas.microsoft.com/office/drawing/2014/main" id="{43BF1CDE-0F62-4B46-8114-A66595E34AE7}"/>
-              </a:ext>
-            </a:extLst>
-          </p:cNvPr>
-          <p:cNvSpPr txBox="1"/>
-          <p:nvPr/>
-        </p:nvSpPr>
-        <p:spPr>
-          <a:xfrm>
-            <a:off x="5927595" y="2332522"/>
-            <a:ext cx="1920450" cy="369332"/>
-          </a:xfrm>
-          <a:prstGeom prst="rect">
-            <a:avLst/>
-          </a:prstGeom>
-          <a:noFill/>
-        </p:spPr>
-        <p:txBody>
-          <a:bodyPr wrap="square" rtlCol="0" anchor="ctr">
-            <a:spAutoFit/>
-          </a:bodyPr>
-          <a:lstStyle/>
-          <a:p>
-            <a:r>
-              <a:rPr lang="en-US" b="1" dirty="0"/>
-              <a:t>another-pin</a:t>
-            </a:r>
-          </a:p>
-        </p:txBody>
-      </p:sp>
       <p:sp>
         <p:nvSpPr>
           <p:cNvPr id="21" name="Rectangle 20">
@@ -1987,10 +1919,10 @@
       </p:pic>
       <p:pic>
         <p:nvPicPr>
-          <p:cNvPr id="33" name="Picture 32" descr="Screen Clipping">
-            <a:extLst>
-              <a:ext uri="{FF2B5EF4-FFF2-40B4-BE49-F238E27FC236}">
-                <a16:creationId xmlns:a16="http://schemas.microsoft.com/office/drawing/2014/main" id="{FF0D9B96-C410-4BC9-8F17-6A1906DDDA82}"/>
+          <p:cNvPr id="34" name="Picture 33" descr="Screen Clipping">
+            <a:extLst>
+              <a:ext uri="{FF2B5EF4-FFF2-40B4-BE49-F238E27FC236}">
+                <a16:creationId xmlns:a16="http://schemas.microsoft.com/office/drawing/2014/main" id="{7DBB007E-0972-4465-BDA9-5351A9DF50F3}"/>
               </a:ext>
             </a:extLst>
           </p:cNvPr>
@@ -2012,41 +1944,6 @@
         </p:blipFill>
         <p:spPr>
           <a:xfrm>
-            <a:off x="5986015" y="2685076"/>
-            <a:ext cx="1828800" cy="203675"/>
-          </a:xfrm>
-          <a:prstGeom prst="rect">
-            <a:avLst/>
-          </a:prstGeom>
-        </p:spPr>
-      </p:pic>
-      <p:pic>
-        <p:nvPicPr>
-          <p:cNvPr id="34" name="Picture 33" descr="Screen Clipping">
-            <a:extLst>
-              <a:ext uri="{FF2B5EF4-FFF2-40B4-BE49-F238E27FC236}">
-                <a16:creationId xmlns:a16="http://schemas.microsoft.com/office/drawing/2014/main" id="{7DBB007E-0972-4465-BDA9-5351A9DF50F3}"/>
-              </a:ext>
-            </a:extLst>
-          </p:cNvPr>
-          <p:cNvPicPr>
-            <a:picLocks noChangeAspect="1"/>
-          </p:cNvPicPr>
-          <p:nvPr/>
-        </p:nvPicPr>
-        <p:blipFill rotWithShape="1">
-          <a:blip r:embed="rId7">
-            <a:extLst>
-              <a:ext uri="{28A0092B-C50C-407E-A947-70E740481C1C}">
-                <a14:useLocalDpi xmlns:a14="http://schemas.microsoft.com/office/drawing/2010/main" val="0"/>
-              </a:ext>
-            </a:extLst>
-          </a:blip>
-          <a:srcRect t="94393"/>
-          <a:stretch/>
-        </p:blipFill>
-        <p:spPr>
-          <a:xfrm>
             <a:off x="2009345" y="2685076"/>
             <a:ext cx="1828800" cy="203675"/>
           </a:xfrm>
@@ -2058,7 +1955,7 @@
     </p:spTree>
     <p:extLst>
       <p:ext uri="{BB962C8B-B14F-4D97-AF65-F5344CB8AC3E}">
-        <p14:creationId xmlns:p14="http://schemas.microsoft.com/office/powerpoint/2010/main" val="525610499"/>
+        <p14:creationId xmlns:p14="http://schemas.microsoft.com/office/powerpoint/2010/main" val="928909290"/>
       </p:ext>
     </p:extLst>
   </p:cSld>
@@ -2668,6 +2565,4089 @@
             <a:pPr algn="r"/>
             <a:r>
               <a:rPr lang="en-US" b="1" dirty="0"/>
+              <a:t>my links</a:t>
+            </a:r>
+          </a:p>
+        </p:txBody>
+      </p:sp>
+      <p:sp>
+        <p:nvSpPr>
+          <p:cNvPr id="6" name="Rectangle 5">
+            <a:extLst>
+              <a:ext uri="{FF2B5EF4-FFF2-40B4-BE49-F238E27FC236}">
+                <a16:creationId xmlns:a16="http://schemas.microsoft.com/office/drawing/2014/main" id="{52D98C57-ADCA-44C9-AE34-431FEC147522}"/>
+              </a:ext>
+            </a:extLst>
+          </p:cNvPr>
+          <p:cNvSpPr/>
+          <p:nvPr/>
+        </p:nvSpPr>
+        <p:spPr>
+          <a:xfrm>
+            <a:off x="707471" y="910735"/>
+            <a:ext cx="1138107" cy="411060"/>
+          </a:xfrm>
+          <a:prstGeom prst="rect">
+            <a:avLst/>
+          </a:prstGeom>
+          <a:solidFill>
+            <a:schemeClr val="tx1">
+              <a:lumMod val="75000"/>
+              <a:lumOff val="25000"/>
+            </a:schemeClr>
+          </a:solidFill>
+        </p:spPr>
+        <p:txBody>
+          <a:bodyPr wrap="square">
+            <a:noAutofit/>
+          </a:bodyPr>
+          <a:lstStyle/>
+          <a:p>
+            <a:endParaRPr lang="en-US" sz="1000">
+              <a:solidFill>
+                <a:schemeClr val="bg1"/>
+              </a:solidFill>
+            </a:endParaRPr>
+          </a:p>
+        </p:txBody>
+      </p:sp>
+      <p:pic>
+        <p:nvPicPr>
+          <p:cNvPr id="8" name="Graphic 7" descr="Magnifying glass">
+            <a:extLst>
+              <a:ext uri="{FF2B5EF4-FFF2-40B4-BE49-F238E27FC236}">
+                <a16:creationId xmlns:a16="http://schemas.microsoft.com/office/drawing/2014/main" id="{09DAF7B4-1EDF-4780-B1FB-85109A6863F8}"/>
+              </a:ext>
+            </a:extLst>
+          </p:cNvPr>
+          <p:cNvPicPr>
+            <a:picLocks noChangeAspect="1"/>
+          </p:cNvPicPr>
+          <p:nvPr/>
+        </p:nvPicPr>
+        <p:blipFill>
+          <a:blip r:embed="rId3">
+            <a:extLst>
+              <a:ext uri="{28A0092B-C50C-407E-A947-70E740481C1C}">
+                <a14:useLocalDpi xmlns:a14="http://schemas.microsoft.com/office/drawing/2010/main" val="0"/>
+              </a:ext>
+              <a:ext uri="{96DAC541-7B7A-43D3-8B79-37D633B846F1}">
+                <asvg:svgBlip xmlns:asvg="http://schemas.microsoft.com/office/drawing/2016/SVG/main" r:embed="rId4"/>
+              </a:ext>
+            </a:extLst>
+          </a:blip>
+          <a:stretch>
+            <a:fillRect/>
+          </a:stretch>
+        </p:blipFill>
+        <p:spPr>
+          <a:xfrm>
+            <a:off x="1489748" y="992155"/>
+            <a:ext cx="228600" cy="228600"/>
+          </a:xfrm>
+          <a:prstGeom prst="rect">
+            <a:avLst/>
+          </a:prstGeom>
+        </p:spPr>
+      </p:pic>
+      <p:pic>
+        <p:nvPicPr>
+          <p:cNvPr id="10" name="Picture 9">
+            <a:extLst>
+              <a:ext uri="{FF2B5EF4-FFF2-40B4-BE49-F238E27FC236}">
+                <a16:creationId xmlns:a16="http://schemas.microsoft.com/office/drawing/2014/main" id="{D0C5F0A4-8A50-4C4E-9ED5-03FB81F166BA}"/>
+              </a:ext>
+            </a:extLst>
+          </p:cNvPr>
+          <p:cNvPicPr>
+            <a:picLocks noChangeAspect="1"/>
+          </p:cNvPicPr>
+          <p:nvPr/>
+        </p:nvPicPr>
+        <p:blipFill>
+          <a:blip r:embed="rId5">
+            <a:extLst>
+              <a:ext uri="{28A0092B-C50C-407E-A947-70E740481C1C}">
+                <a14:useLocalDpi xmlns:a14="http://schemas.microsoft.com/office/drawing/2010/main" val="0"/>
+              </a:ext>
+            </a:extLst>
+          </a:blip>
+          <a:stretch>
+            <a:fillRect/>
+          </a:stretch>
+        </p:blipFill>
+        <p:spPr>
+          <a:xfrm>
+            <a:off x="806639" y="992155"/>
+            <a:ext cx="228600" cy="228600"/>
+          </a:xfrm>
+          <a:prstGeom prst="rect">
+            <a:avLst/>
+          </a:prstGeom>
+        </p:spPr>
+      </p:pic>
+      <p:pic>
+        <p:nvPicPr>
+          <p:cNvPr id="14" name="Picture 13" descr="Screen Clipping">
+            <a:extLst>
+              <a:ext uri="{FF2B5EF4-FFF2-40B4-BE49-F238E27FC236}">
+                <a16:creationId xmlns:a16="http://schemas.microsoft.com/office/drawing/2014/main" id="{B809BE7E-7731-49FD-9380-BE663FFA9FFE}"/>
+              </a:ext>
+            </a:extLst>
+          </p:cNvPr>
+          <p:cNvPicPr>
+            <a:picLocks noChangeAspect="1"/>
+          </p:cNvPicPr>
+          <p:nvPr/>
+        </p:nvPicPr>
+        <p:blipFill rotWithShape="1">
+          <a:blip r:embed="rId6">
+            <a:extLst>
+              <a:ext uri="{28A0092B-C50C-407E-A947-70E740481C1C}">
+                <a14:useLocalDpi xmlns:a14="http://schemas.microsoft.com/office/drawing/2010/main" val="0"/>
+              </a:ext>
+            </a:extLst>
+          </a:blip>
+          <a:srcRect b="4738"/>
+          <a:stretch/>
+        </p:blipFill>
+        <p:spPr>
+          <a:xfrm>
+            <a:off x="2025797" y="2890607"/>
+            <a:ext cx="1828800" cy="3795419"/>
+          </a:xfrm>
+          <a:prstGeom prst="rect">
+            <a:avLst/>
+          </a:prstGeom>
+        </p:spPr>
+      </p:pic>
+      <p:pic>
+        <p:nvPicPr>
+          <p:cNvPr id="16" name="Picture 15" descr="Screen Clipping">
+            <a:extLst>
+              <a:ext uri="{FF2B5EF4-FFF2-40B4-BE49-F238E27FC236}">
+                <a16:creationId xmlns:a16="http://schemas.microsoft.com/office/drawing/2014/main" id="{7B141C36-0BCC-4311-9BB5-D2F52039442D}"/>
+              </a:ext>
+            </a:extLst>
+          </p:cNvPr>
+          <p:cNvPicPr>
+            <a:picLocks noChangeAspect="1"/>
+          </p:cNvPicPr>
+          <p:nvPr/>
+        </p:nvPicPr>
+        <p:blipFill rotWithShape="1">
+          <a:blip r:embed="rId7">
+            <a:extLst>
+              <a:ext uri="{28A0092B-C50C-407E-A947-70E740481C1C}">
+                <a14:useLocalDpi xmlns:a14="http://schemas.microsoft.com/office/drawing/2010/main" val="0"/>
+              </a:ext>
+            </a:extLst>
+          </a:blip>
+          <a:srcRect b="5239"/>
+          <a:stretch/>
+        </p:blipFill>
+        <p:spPr>
+          <a:xfrm>
+            <a:off x="4007146" y="2890607"/>
+            <a:ext cx="1828800" cy="3442448"/>
+          </a:xfrm>
+          <a:prstGeom prst="rect">
+            <a:avLst/>
+          </a:prstGeom>
+        </p:spPr>
+      </p:pic>
+      <p:sp>
+        <p:nvSpPr>
+          <p:cNvPr id="17" name="TextBox 16">
+            <a:extLst>
+              <a:ext uri="{FF2B5EF4-FFF2-40B4-BE49-F238E27FC236}">
+                <a16:creationId xmlns:a16="http://schemas.microsoft.com/office/drawing/2014/main" id="{D020BD92-32A2-4F20-9D8A-14956D882287}"/>
+              </a:ext>
+            </a:extLst>
+          </p:cNvPr>
+          <p:cNvSpPr txBox="1"/>
+          <p:nvPr/>
+        </p:nvSpPr>
+        <p:spPr>
+          <a:xfrm>
+            <a:off x="2025798" y="2332522"/>
+            <a:ext cx="1828800" cy="369332"/>
+          </a:xfrm>
+          <a:prstGeom prst="rect">
+            <a:avLst/>
+          </a:prstGeom>
+          <a:noFill/>
+        </p:spPr>
+        <p:txBody>
+          <a:bodyPr wrap="square" rtlCol="0" anchor="ctr">
+            <a:spAutoFit/>
+          </a:bodyPr>
+          <a:lstStyle/>
+          <a:p>
+            <a:r>
+              <a:rPr lang="en-US" b="1" dirty="0" err="1"/>
+              <a:t>dnd</a:t>
+            </a:r>
+            <a:endParaRPr lang="en-US" b="1" dirty="0"/>
+          </a:p>
+        </p:txBody>
+      </p:sp>
+      <p:sp>
+        <p:nvSpPr>
+          <p:cNvPr id="18" name="TextBox 17">
+            <a:extLst>
+              <a:ext uri="{FF2B5EF4-FFF2-40B4-BE49-F238E27FC236}">
+                <a16:creationId xmlns:a16="http://schemas.microsoft.com/office/drawing/2014/main" id="{7DD97B8E-B7A2-49F2-990B-DBF22FEA67C8}"/>
+              </a:ext>
+            </a:extLst>
+          </p:cNvPr>
+          <p:cNvSpPr txBox="1"/>
+          <p:nvPr/>
+        </p:nvSpPr>
+        <p:spPr>
+          <a:xfrm>
+            <a:off x="3915497" y="2332522"/>
+            <a:ext cx="1920450" cy="369332"/>
+          </a:xfrm>
+          <a:prstGeom prst="rect">
+            <a:avLst/>
+          </a:prstGeom>
+          <a:noFill/>
+        </p:spPr>
+        <p:txBody>
+          <a:bodyPr wrap="square" rtlCol="0" anchor="ctr">
+            <a:spAutoFit/>
+          </a:bodyPr>
+          <a:lstStyle/>
+          <a:p>
+            <a:r>
+              <a:rPr lang="en-US" b="1" dirty="0"/>
+              <a:t>recent-visits</a:t>
+            </a:r>
+          </a:p>
+        </p:txBody>
+      </p:sp>
+      <p:pic>
+        <p:nvPicPr>
+          <p:cNvPr id="19" name="Picture 18" descr="Screen Clipping">
+            <a:extLst>
+              <a:ext uri="{FF2B5EF4-FFF2-40B4-BE49-F238E27FC236}">
+                <a16:creationId xmlns:a16="http://schemas.microsoft.com/office/drawing/2014/main" id="{9901026C-A7FB-487A-94CF-705CB218C346}"/>
+              </a:ext>
+            </a:extLst>
+          </p:cNvPr>
+          <p:cNvPicPr>
+            <a:picLocks noChangeAspect="1"/>
+          </p:cNvPicPr>
+          <p:nvPr/>
+        </p:nvPicPr>
+        <p:blipFill rotWithShape="1">
+          <a:blip r:embed="rId7">
+            <a:extLst>
+              <a:ext uri="{28A0092B-C50C-407E-A947-70E740481C1C}">
+                <a14:useLocalDpi xmlns:a14="http://schemas.microsoft.com/office/drawing/2010/main" val="0"/>
+              </a:ext>
+            </a:extLst>
+          </a:blip>
+          <a:srcRect b="5314"/>
+          <a:stretch/>
+        </p:blipFill>
+        <p:spPr>
+          <a:xfrm>
+            <a:off x="5988493" y="2890607"/>
+            <a:ext cx="1828800" cy="3439736"/>
+          </a:xfrm>
+          <a:prstGeom prst="rect">
+            <a:avLst/>
+          </a:prstGeom>
+        </p:spPr>
+      </p:pic>
+      <p:sp>
+        <p:nvSpPr>
+          <p:cNvPr id="20" name="TextBox 19">
+            <a:extLst>
+              <a:ext uri="{FF2B5EF4-FFF2-40B4-BE49-F238E27FC236}">
+                <a16:creationId xmlns:a16="http://schemas.microsoft.com/office/drawing/2014/main" id="{43BF1CDE-0F62-4B46-8114-A66595E34AE7}"/>
+              </a:ext>
+            </a:extLst>
+          </p:cNvPr>
+          <p:cNvSpPr txBox="1"/>
+          <p:nvPr/>
+        </p:nvSpPr>
+        <p:spPr>
+          <a:xfrm>
+            <a:off x="5927595" y="2332522"/>
+            <a:ext cx="1920450" cy="369332"/>
+          </a:xfrm>
+          <a:prstGeom prst="rect">
+            <a:avLst/>
+          </a:prstGeom>
+          <a:noFill/>
+        </p:spPr>
+        <p:txBody>
+          <a:bodyPr wrap="square" rtlCol="0" anchor="ctr">
+            <a:spAutoFit/>
+          </a:bodyPr>
+          <a:lstStyle/>
+          <a:p>
+            <a:r>
+              <a:rPr lang="en-US" b="1" dirty="0"/>
+              <a:t>another-pin</a:t>
+            </a:r>
+          </a:p>
+        </p:txBody>
+      </p:sp>
+      <p:sp>
+        <p:nvSpPr>
+          <p:cNvPr id="21" name="Rectangle 20">
+            <a:extLst>
+              <a:ext uri="{FF2B5EF4-FFF2-40B4-BE49-F238E27FC236}">
+                <a16:creationId xmlns:a16="http://schemas.microsoft.com/office/drawing/2014/main" id="{A47C786E-6AA6-4835-9930-B3DB83FDFEA0}"/>
+              </a:ext>
+            </a:extLst>
+          </p:cNvPr>
+          <p:cNvSpPr/>
+          <p:nvPr/>
+        </p:nvSpPr>
+        <p:spPr>
+          <a:xfrm>
+            <a:off x="8703578" y="1124654"/>
+            <a:ext cx="2663505" cy="411060"/>
+          </a:xfrm>
+          <a:prstGeom prst="rect">
+            <a:avLst/>
+          </a:prstGeom>
+          <a:solidFill>
+            <a:schemeClr val="tx1">
+              <a:lumMod val="75000"/>
+              <a:lumOff val="25000"/>
+            </a:schemeClr>
+          </a:solidFill>
+        </p:spPr>
+        <p:txBody>
+          <a:bodyPr wrap="square">
+            <a:noAutofit/>
+          </a:bodyPr>
+          <a:lstStyle/>
+          <a:p>
+            <a:endParaRPr lang="en-US" sz="1000">
+              <a:solidFill>
+                <a:schemeClr val="bg1"/>
+              </a:solidFill>
+            </a:endParaRPr>
+          </a:p>
+        </p:txBody>
+      </p:sp>
+      <p:pic>
+        <p:nvPicPr>
+          <p:cNvPr id="22" name="Graphic 21" descr="Magnifying glass">
+            <a:extLst>
+              <a:ext uri="{FF2B5EF4-FFF2-40B4-BE49-F238E27FC236}">
+                <a16:creationId xmlns:a16="http://schemas.microsoft.com/office/drawing/2014/main" id="{503A6989-CF6B-475B-B4C2-991DB2E85D5A}"/>
+              </a:ext>
+            </a:extLst>
+          </p:cNvPr>
+          <p:cNvPicPr>
+            <a:picLocks noChangeAspect="1"/>
+          </p:cNvPicPr>
+          <p:nvPr/>
+        </p:nvPicPr>
+        <p:blipFill>
+          <a:blip r:embed="rId3">
+            <a:extLst>
+              <a:ext uri="{28A0092B-C50C-407E-A947-70E740481C1C}">
+                <a14:useLocalDpi xmlns:a14="http://schemas.microsoft.com/office/drawing/2010/main" val="0"/>
+              </a:ext>
+              <a:ext uri="{96DAC541-7B7A-43D3-8B79-37D633B846F1}">
+                <asvg:svgBlip xmlns:asvg="http://schemas.microsoft.com/office/drawing/2016/SVG/main" r:embed="rId4"/>
+              </a:ext>
+            </a:extLst>
+          </a:blip>
+          <a:stretch>
+            <a:fillRect/>
+          </a:stretch>
+        </p:blipFill>
+        <p:spPr>
+          <a:xfrm>
+            <a:off x="11012652" y="1206074"/>
+            <a:ext cx="228600" cy="228600"/>
+          </a:xfrm>
+          <a:prstGeom prst="rect">
+            <a:avLst/>
+          </a:prstGeom>
+        </p:spPr>
+      </p:pic>
+      <p:pic>
+        <p:nvPicPr>
+          <p:cNvPr id="23" name="Picture 22">
+            <a:extLst>
+              <a:ext uri="{FF2B5EF4-FFF2-40B4-BE49-F238E27FC236}">
+                <a16:creationId xmlns:a16="http://schemas.microsoft.com/office/drawing/2014/main" id="{1E1A6C70-27BC-402B-96F1-0E0B0811C207}"/>
+              </a:ext>
+            </a:extLst>
+          </p:cNvPr>
+          <p:cNvPicPr>
+            <a:picLocks noChangeAspect="1"/>
+          </p:cNvPicPr>
+          <p:nvPr/>
+        </p:nvPicPr>
+        <p:blipFill>
+          <a:blip r:embed="rId5">
+            <a:extLst>
+              <a:ext uri="{28A0092B-C50C-407E-A947-70E740481C1C}">
+                <a14:useLocalDpi xmlns:a14="http://schemas.microsoft.com/office/drawing/2010/main" val="0"/>
+              </a:ext>
+            </a:extLst>
+          </a:blip>
+          <a:stretch>
+            <a:fillRect/>
+          </a:stretch>
+        </p:blipFill>
+        <p:spPr>
+          <a:xfrm>
+            <a:off x="8802746" y="1206074"/>
+            <a:ext cx="228600" cy="228600"/>
+          </a:xfrm>
+          <a:prstGeom prst="rect">
+            <a:avLst/>
+          </a:prstGeom>
+        </p:spPr>
+      </p:pic>
+      <p:pic>
+        <p:nvPicPr>
+          <p:cNvPr id="24" name="Picture 23" descr="Screen Clipping">
+            <a:extLst>
+              <a:ext uri="{FF2B5EF4-FFF2-40B4-BE49-F238E27FC236}">
+                <a16:creationId xmlns:a16="http://schemas.microsoft.com/office/drawing/2014/main" id="{4B28A496-93F4-4129-8B7C-CE227CC501E0}"/>
+              </a:ext>
+            </a:extLst>
+          </p:cNvPr>
+          <p:cNvPicPr>
+            <a:picLocks noChangeAspect="1"/>
+          </p:cNvPicPr>
+          <p:nvPr/>
+        </p:nvPicPr>
+        <p:blipFill rotWithShape="1">
+          <a:blip r:embed="rId2">
+            <a:extLst>
+              <a:ext uri="{28A0092B-C50C-407E-A947-70E740481C1C}">
+                <a14:useLocalDpi xmlns:a14="http://schemas.microsoft.com/office/drawing/2010/main" val="0"/>
+              </a:ext>
+            </a:extLst>
+          </a:blip>
+          <a:srcRect r="57768"/>
+          <a:stretch/>
+        </p:blipFill>
+        <p:spPr>
+          <a:xfrm>
+            <a:off x="8729216" y="1886567"/>
+            <a:ext cx="2611053" cy="801939"/>
+          </a:xfrm>
+          <a:prstGeom prst="rect">
+            <a:avLst/>
+          </a:prstGeom>
+        </p:spPr>
+      </p:pic>
+      <p:pic>
+        <p:nvPicPr>
+          <p:cNvPr id="25" name="Picture 24" descr="Screen Clipping">
+            <a:extLst>
+              <a:ext uri="{FF2B5EF4-FFF2-40B4-BE49-F238E27FC236}">
+                <a16:creationId xmlns:a16="http://schemas.microsoft.com/office/drawing/2014/main" id="{3C8AE91D-2B35-4007-A957-804E88515AA7}"/>
+              </a:ext>
+            </a:extLst>
+          </p:cNvPr>
+          <p:cNvPicPr>
+            <a:picLocks noChangeAspect="1"/>
+          </p:cNvPicPr>
+          <p:nvPr/>
+        </p:nvPicPr>
+        <p:blipFill rotWithShape="1">
+          <a:blip r:embed="rId2">
+            <a:extLst>
+              <a:ext uri="{28A0092B-C50C-407E-A947-70E740481C1C}">
+                <a14:useLocalDpi xmlns:a14="http://schemas.microsoft.com/office/drawing/2010/main" val="0"/>
+              </a:ext>
+            </a:extLst>
+          </a:blip>
+          <a:srcRect l="43051" r="14441"/>
+          <a:stretch/>
+        </p:blipFill>
+        <p:spPr>
+          <a:xfrm>
+            <a:off x="8703578" y="2732103"/>
+            <a:ext cx="2628146" cy="801939"/>
+          </a:xfrm>
+          <a:prstGeom prst="rect">
+            <a:avLst/>
+          </a:prstGeom>
+        </p:spPr>
+      </p:pic>
+      <p:pic>
+        <p:nvPicPr>
+          <p:cNvPr id="26" name="Picture 25" descr="Screen Clipping">
+            <a:extLst>
+              <a:ext uri="{FF2B5EF4-FFF2-40B4-BE49-F238E27FC236}">
+                <a16:creationId xmlns:a16="http://schemas.microsoft.com/office/drawing/2014/main" id="{9D72E4B2-58AE-43AB-915B-BDF1EEEC5D7D}"/>
+              </a:ext>
+            </a:extLst>
+          </p:cNvPr>
+          <p:cNvPicPr>
+            <a:picLocks noChangeAspect="1"/>
+          </p:cNvPicPr>
+          <p:nvPr/>
+        </p:nvPicPr>
+        <p:blipFill rotWithShape="1">
+          <a:blip r:embed="rId2">
+            <a:extLst>
+              <a:ext uri="{28A0092B-C50C-407E-A947-70E740481C1C}">
+                <a14:useLocalDpi xmlns:a14="http://schemas.microsoft.com/office/drawing/2010/main" val="0"/>
+              </a:ext>
+            </a:extLst>
+          </a:blip>
+          <a:srcRect l="87102"/>
+          <a:stretch/>
+        </p:blipFill>
+        <p:spPr>
+          <a:xfrm>
+            <a:off x="8729215" y="3575068"/>
+            <a:ext cx="797411" cy="801939"/>
+          </a:xfrm>
+          <a:prstGeom prst="rect">
+            <a:avLst/>
+          </a:prstGeom>
+        </p:spPr>
+      </p:pic>
+      <p:sp>
+        <p:nvSpPr>
+          <p:cNvPr id="27" name="TextBox 26">
+            <a:extLst>
+              <a:ext uri="{FF2B5EF4-FFF2-40B4-BE49-F238E27FC236}">
+                <a16:creationId xmlns:a16="http://schemas.microsoft.com/office/drawing/2014/main" id="{9809BF05-4CB7-4F5A-97EA-B88A8E1AD922}"/>
+              </a:ext>
+            </a:extLst>
+          </p:cNvPr>
+          <p:cNvSpPr txBox="1"/>
+          <p:nvPr/>
+        </p:nvSpPr>
+        <p:spPr>
+          <a:xfrm>
+            <a:off x="8729214" y="1517235"/>
+            <a:ext cx="2602509" cy="369332"/>
+          </a:xfrm>
+          <a:prstGeom prst="rect">
+            <a:avLst/>
+          </a:prstGeom>
+          <a:noFill/>
+        </p:spPr>
+        <p:txBody>
+          <a:bodyPr wrap="square" rtlCol="0" anchor="ctr">
+            <a:spAutoFit/>
+          </a:bodyPr>
+          <a:lstStyle/>
+          <a:p>
+            <a:pPr algn="r"/>
+            <a:r>
+              <a:rPr lang="en-US" b="1" dirty="0"/>
+              <a:t>my links</a:t>
+            </a:r>
+          </a:p>
+        </p:txBody>
+      </p:sp>
+      <p:sp>
+        <p:nvSpPr>
+          <p:cNvPr id="29" name="TextBox 28">
+            <a:extLst>
+              <a:ext uri="{FF2B5EF4-FFF2-40B4-BE49-F238E27FC236}">
+                <a16:creationId xmlns:a16="http://schemas.microsoft.com/office/drawing/2014/main" id="{9DD355AC-0E70-49FD-9DB7-66D96B2928F0}"/>
+              </a:ext>
+            </a:extLst>
+          </p:cNvPr>
+          <p:cNvSpPr txBox="1"/>
+          <p:nvPr/>
+        </p:nvSpPr>
+        <p:spPr>
+          <a:xfrm>
+            <a:off x="8729212" y="4418033"/>
+            <a:ext cx="2602509" cy="369332"/>
+          </a:xfrm>
+          <a:prstGeom prst="rect">
+            <a:avLst/>
+          </a:prstGeom>
+          <a:noFill/>
+        </p:spPr>
+        <p:txBody>
+          <a:bodyPr wrap="square" rtlCol="0" anchor="ctr">
+            <a:spAutoFit/>
+          </a:bodyPr>
+          <a:lstStyle/>
+          <a:p>
+            <a:r>
+              <a:rPr lang="en-US" b="1" dirty="0" err="1"/>
+              <a:t>dnd</a:t>
+            </a:r>
+            <a:r>
+              <a:rPr lang="en-US" b="1" dirty="0"/>
+              <a:t> …</a:t>
+            </a:r>
+          </a:p>
+        </p:txBody>
+      </p:sp>
+      <p:sp>
+        <p:nvSpPr>
+          <p:cNvPr id="30" name="TextBox 29">
+            <a:extLst>
+              <a:ext uri="{FF2B5EF4-FFF2-40B4-BE49-F238E27FC236}">
+                <a16:creationId xmlns:a16="http://schemas.microsoft.com/office/drawing/2014/main" id="{D5BBDF26-D750-4BC7-B6EF-899B7C8DDBF3}"/>
+              </a:ext>
+            </a:extLst>
+          </p:cNvPr>
+          <p:cNvSpPr txBox="1"/>
+          <p:nvPr/>
+        </p:nvSpPr>
+        <p:spPr>
+          <a:xfrm>
+            <a:off x="8729212" y="4767660"/>
+            <a:ext cx="2602509" cy="369332"/>
+          </a:xfrm>
+          <a:prstGeom prst="rect">
+            <a:avLst/>
+          </a:prstGeom>
+          <a:noFill/>
+        </p:spPr>
+        <p:txBody>
+          <a:bodyPr wrap="square" rtlCol="0" anchor="ctr">
+            <a:spAutoFit/>
+          </a:bodyPr>
+          <a:lstStyle/>
+          <a:p>
+            <a:r>
+              <a:rPr lang="en-US" b="1" dirty="0"/>
+              <a:t>recent-visits …</a:t>
+            </a:r>
+          </a:p>
+        </p:txBody>
+      </p:sp>
+      <p:sp>
+        <p:nvSpPr>
+          <p:cNvPr id="31" name="TextBox 30">
+            <a:extLst>
+              <a:ext uri="{FF2B5EF4-FFF2-40B4-BE49-F238E27FC236}">
+                <a16:creationId xmlns:a16="http://schemas.microsoft.com/office/drawing/2014/main" id="{2A1F03F8-B5BA-4C54-A753-8B5CF3B95F66}"/>
+              </a:ext>
+            </a:extLst>
+          </p:cNvPr>
+          <p:cNvSpPr txBox="1"/>
+          <p:nvPr/>
+        </p:nvSpPr>
+        <p:spPr>
+          <a:xfrm>
+            <a:off x="8729212" y="5117288"/>
+            <a:ext cx="2602509" cy="369332"/>
+          </a:xfrm>
+          <a:prstGeom prst="rect">
+            <a:avLst/>
+          </a:prstGeom>
+          <a:noFill/>
+        </p:spPr>
+        <p:txBody>
+          <a:bodyPr wrap="square" rtlCol="0" anchor="ctr">
+            <a:spAutoFit/>
+          </a:bodyPr>
+          <a:lstStyle/>
+          <a:p>
+            <a:r>
+              <a:rPr lang="en-US" b="1" dirty="0"/>
+              <a:t>another-pin …</a:t>
+            </a:r>
+          </a:p>
+        </p:txBody>
+      </p:sp>
+      <p:pic>
+        <p:nvPicPr>
+          <p:cNvPr id="32" name="Picture 31" descr="Screen Clipping">
+            <a:extLst>
+              <a:ext uri="{FF2B5EF4-FFF2-40B4-BE49-F238E27FC236}">
+                <a16:creationId xmlns:a16="http://schemas.microsoft.com/office/drawing/2014/main" id="{30D28E44-C964-4CEE-8171-21288A13A445}"/>
+              </a:ext>
+            </a:extLst>
+          </p:cNvPr>
+          <p:cNvPicPr>
+            <a:picLocks noChangeAspect="1"/>
+          </p:cNvPicPr>
+          <p:nvPr/>
+        </p:nvPicPr>
+        <p:blipFill rotWithShape="1">
+          <a:blip r:embed="rId7">
+            <a:extLst>
+              <a:ext uri="{28A0092B-C50C-407E-A947-70E740481C1C}">
+                <a14:useLocalDpi xmlns:a14="http://schemas.microsoft.com/office/drawing/2010/main" val="0"/>
+              </a:ext>
+            </a:extLst>
+          </a:blip>
+          <a:srcRect t="94393"/>
+          <a:stretch/>
+        </p:blipFill>
+        <p:spPr>
+          <a:xfrm>
+            <a:off x="3997680" y="2685076"/>
+            <a:ext cx="1828800" cy="203675"/>
+          </a:xfrm>
+          <a:prstGeom prst="rect">
+            <a:avLst/>
+          </a:prstGeom>
+        </p:spPr>
+      </p:pic>
+      <p:pic>
+        <p:nvPicPr>
+          <p:cNvPr id="33" name="Picture 32" descr="Screen Clipping">
+            <a:extLst>
+              <a:ext uri="{FF2B5EF4-FFF2-40B4-BE49-F238E27FC236}">
+                <a16:creationId xmlns:a16="http://schemas.microsoft.com/office/drawing/2014/main" id="{FF0D9B96-C410-4BC9-8F17-6A1906DDDA82}"/>
+              </a:ext>
+            </a:extLst>
+          </p:cNvPr>
+          <p:cNvPicPr>
+            <a:picLocks noChangeAspect="1"/>
+          </p:cNvPicPr>
+          <p:nvPr/>
+        </p:nvPicPr>
+        <p:blipFill rotWithShape="1">
+          <a:blip r:embed="rId7">
+            <a:extLst>
+              <a:ext uri="{28A0092B-C50C-407E-A947-70E740481C1C}">
+                <a14:useLocalDpi xmlns:a14="http://schemas.microsoft.com/office/drawing/2010/main" val="0"/>
+              </a:ext>
+            </a:extLst>
+          </a:blip>
+          <a:srcRect t="94393"/>
+          <a:stretch/>
+        </p:blipFill>
+        <p:spPr>
+          <a:xfrm>
+            <a:off x="5986015" y="2685076"/>
+            <a:ext cx="1828800" cy="203675"/>
+          </a:xfrm>
+          <a:prstGeom prst="rect">
+            <a:avLst/>
+          </a:prstGeom>
+        </p:spPr>
+      </p:pic>
+      <p:pic>
+        <p:nvPicPr>
+          <p:cNvPr id="34" name="Picture 33" descr="Screen Clipping">
+            <a:extLst>
+              <a:ext uri="{FF2B5EF4-FFF2-40B4-BE49-F238E27FC236}">
+                <a16:creationId xmlns:a16="http://schemas.microsoft.com/office/drawing/2014/main" id="{7DBB007E-0972-4465-BDA9-5351A9DF50F3}"/>
+              </a:ext>
+            </a:extLst>
+          </p:cNvPr>
+          <p:cNvPicPr>
+            <a:picLocks noChangeAspect="1"/>
+          </p:cNvPicPr>
+          <p:nvPr/>
+        </p:nvPicPr>
+        <p:blipFill rotWithShape="1">
+          <a:blip r:embed="rId7">
+            <a:extLst>
+              <a:ext uri="{28A0092B-C50C-407E-A947-70E740481C1C}">
+                <a14:useLocalDpi xmlns:a14="http://schemas.microsoft.com/office/drawing/2010/main" val="0"/>
+              </a:ext>
+            </a:extLst>
+          </a:blip>
+          <a:srcRect t="94393"/>
+          <a:stretch/>
+        </p:blipFill>
+        <p:spPr>
+          <a:xfrm>
+            <a:off x="2009345" y="2685076"/>
+            <a:ext cx="1828800" cy="203675"/>
+          </a:xfrm>
+          <a:prstGeom prst="rect">
+            <a:avLst/>
+          </a:prstGeom>
+        </p:spPr>
+      </p:pic>
+      <p:sp>
+        <p:nvSpPr>
+          <p:cNvPr id="28" name="Rectangle 27">
+            <a:extLst>
+              <a:ext uri="{FF2B5EF4-FFF2-40B4-BE49-F238E27FC236}">
+                <a16:creationId xmlns:a16="http://schemas.microsoft.com/office/drawing/2014/main" id="{87A6A00F-703B-4767-830A-A851FA2BB872}"/>
+              </a:ext>
+            </a:extLst>
+          </p:cNvPr>
+          <p:cNvSpPr/>
+          <p:nvPr/>
+        </p:nvSpPr>
+        <p:spPr>
+          <a:xfrm>
+            <a:off x="4713211" y="910735"/>
+            <a:ext cx="3313214" cy="5775291"/>
+          </a:xfrm>
+          <a:prstGeom prst="rect">
+            <a:avLst/>
+          </a:prstGeom>
+          <a:solidFill>
+            <a:schemeClr val="tx1">
+              <a:lumMod val="75000"/>
+              <a:lumOff val="25000"/>
+            </a:schemeClr>
+          </a:solidFill>
+        </p:spPr>
+        <p:txBody>
+          <a:bodyPr wrap="square">
+            <a:noAutofit/>
+          </a:bodyPr>
+          <a:lstStyle/>
+          <a:p>
+            <a:r>
+              <a:rPr lang="en-US" b="1" dirty="0" err="1">
+                <a:solidFill>
+                  <a:schemeClr val="bg1"/>
+                </a:solidFill>
+              </a:rPr>
+              <a:t>Bookmartian</a:t>
+            </a:r>
+            <a:endParaRPr lang="en-US" b="1" dirty="0">
+              <a:solidFill>
+                <a:schemeClr val="bg1"/>
+              </a:solidFill>
+            </a:endParaRPr>
+          </a:p>
+        </p:txBody>
+      </p:sp>
+      <p:sp>
+        <p:nvSpPr>
+          <p:cNvPr id="7" name="TextBox 6">
+            <a:extLst>
+              <a:ext uri="{FF2B5EF4-FFF2-40B4-BE49-F238E27FC236}">
+                <a16:creationId xmlns:a16="http://schemas.microsoft.com/office/drawing/2014/main" id="{C802180F-E8E3-494E-969E-93DF59158ED1}"/>
+              </a:ext>
+            </a:extLst>
+          </p:cNvPr>
+          <p:cNvSpPr txBox="1"/>
+          <p:nvPr/>
+        </p:nvSpPr>
+        <p:spPr>
+          <a:xfrm>
+            <a:off x="4843881" y="1477752"/>
+            <a:ext cx="458780" cy="276999"/>
+          </a:xfrm>
+          <a:prstGeom prst="rect">
+            <a:avLst/>
+          </a:prstGeom>
+          <a:noFill/>
+        </p:spPr>
+        <p:txBody>
+          <a:bodyPr wrap="none" rtlCol="0">
+            <a:spAutoFit/>
+          </a:bodyPr>
+          <a:lstStyle/>
+          <a:p>
+            <a:r>
+              <a:rPr lang="en-US" sz="1200" dirty="0">
+                <a:solidFill>
+                  <a:schemeClr val="bg1"/>
+                </a:solidFill>
+              </a:rPr>
+              <a:t>Title</a:t>
+            </a:r>
+          </a:p>
+        </p:txBody>
+      </p:sp>
+      <p:sp>
+        <p:nvSpPr>
+          <p:cNvPr id="9" name="Rectangle 8">
+            <a:extLst>
+              <a:ext uri="{FF2B5EF4-FFF2-40B4-BE49-F238E27FC236}">
+                <a16:creationId xmlns:a16="http://schemas.microsoft.com/office/drawing/2014/main" id="{F6D56084-D140-47D1-A518-5162E88E6B8A}"/>
+              </a:ext>
+            </a:extLst>
+          </p:cNvPr>
+          <p:cNvSpPr/>
+          <p:nvPr/>
+        </p:nvSpPr>
+        <p:spPr>
+          <a:xfrm>
+            <a:off x="5399645" y="1468820"/>
+            <a:ext cx="2448399" cy="294863"/>
+          </a:xfrm>
+          <a:prstGeom prst="rect">
+            <a:avLst/>
+          </a:prstGeom>
+          <a:solidFill>
+            <a:schemeClr val="bg1"/>
+          </a:solidFill>
+          <a:ln>
+            <a:solidFill>
+              <a:schemeClr val="tx1"/>
+            </a:solidFill>
+          </a:ln>
+        </p:spPr>
+        <p:style>
+          <a:lnRef idx="2">
+            <a:schemeClr val="accent1">
+              <a:shade val="50000"/>
+            </a:schemeClr>
+          </a:lnRef>
+          <a:fillRef idx="1">
+            <a:schemeClr val="accent1"/>
+          </a:fillRef>
+          <a:effectRef idx="0">
+            <a:schemeClr val="accent1"/>
+          </a:effectRef>
+          <a:fontRef idx="minor">
+            <a:schemeClr val="lt1"/>
+          </a:fontRef>
+        </p:style>
+        <p:txBody>
+          <a:bodyPr rtlCol="0" anchor="ctr"/>
+          <a:lstStyle/>
+          <a:p>
+            <a:pPr algn="ctr"/>
+            <a:endParaRPr lang="en-US"/>
+          </a:p>
+        </p:txBody>
+      </p:sp>
+      <p:sp>
+        <p:nvSpPr>
+          <p:cNvPr id="35" name="TextBox 34">
+            <a:extLst>
+              <a:ext uri="{FF2B5EF4-FFF2-40B4-BE49-F238E27FC236}">
+                <a16:creationId xmlns:a16="http://schemas.microsoft.com/office/drawing/2014/main" id="{CA60BE18-860F-44C5-B42D-252056FAF2F7}"/>
+              </a:ext>
+            </a:extLst>
+          </p:cNvPr>
+          <p:cNvSpPr txBox="1"/>
+          <p:nvPr/>
+        </p:nvSpPr>
+        <p:spPr>
+          <a:xfrm>
+            <a:off x="4843881" y="1927571"/>
+            <a:ext cx="431528" cy="276999"/>
+          </a:xfrm>
+          <a:prstGeom prst="rect">
+            <a:avLst/>
+          </a:prstGeom>
+          <a:noFill/>
+        </p:spPr>
+        <p:txBody>
+          <a:bodyPr wrap="none" rtlCol="0">
+            <a:spAutoFit/>
+          </a:bodyPr>
+          <a:lstStyle/>
+          <a:p>
+            <a:r>
+              <a:rPr lang="en-US" sz="1200" dirty="0">
+                <a:solidFill>
+                  <a:schemeClr val="bg1"/>
+                </a:solidFill>
+              </a:rPr>
+              <a:t>URL</a:t>
+            </a:r>
+          </a:p>
+        </p:txBody>
+      </p:sp>
+      <p:sp>
+        <p:nvSpPr>
+          <p:cNvPr id="36" name="Rectangle 35">
+            <a:extLst>
+              <a:ext uri="{FF2B5EF4-FFF2-40B4-BE49-F238E27FC236}">
+                <a16:creationId xmlns:a16="http://schemas.microsoft.com/office/drawing/2014/main" id="{EF536020-9CEE-4CF9-BF8C-22D2FFB54BC7}"/>
+              </a:ext>
+            </a:extLst>
+          </p:cNvPr>
+          <p:cNvSpPr/>
+          <p:nvPr/>
+        </p:nvSpPr>
+        <p:spPr>
+          <a:xfrm>
+            <a:off x="5399645" y="1918639"/>
+            <a:ext cx="2448399" cy="294863"/>
+          </a:xfrm>
+          <a:prstGeom prst="rect">
+            <a:avLst/>
+          </a:prstGeom>
+          <a:solidFill>
+            <a:schemeClr val="bg1"/>
+          </a:solidFill>
+          <a:ln>
+            <a:solidFill>
+              <a:schemeClr val="tx1"/>
+            </a:solidFill>
+          </a:ln>
+        </p:spPr>
+        <p:style>
+          <a:lnRef idx="2">
+            <a:schemeClr val="accent1">
+              <a:shade val="50000"/>
+            </a:schemeClr>
+          </a:lnRef>
+          <a:fillRef idx="1">
+            <a:schemeClr val="accent1"/>
+          </a:fillRef>
+          <a:effectRef idx="0">
+            <a:schemeClr val="accent1"/>
+          </a:effectRef>
+          <a:fontRef idx="minor">
+            <a:schemeClr val="lt1"/>
+          </a:fontRef>
+        </p:style>
+        <p:txBody>
+          <a:bodyPr rtlCol="0" anchor="ctr"/>
+          <a:lstStyle/>
+          <a:p>
+            <a:pPr algn="ctr"/>
+            <a:endParaRPr lang="en-US"/>
+          </a:p>
+        </p:txBody>
+      </p:sp>
+      <p:sp>
+        <p:nvSpPr>
+          <p:cNvPr id="37" name="TextBox 36">
+            <a:extLst>
+              <a:ext uri="{FF2B5EF4-FFF2-40B4-BE49-F238E27FC236}">
+                <a16:creationId xmlns:a16="http://schemas.microsoft.com/office/drawing/2014/main" id="{24612D55-49A8-41CF-9609-85B8D821B5C5}"/>
+              </a:ext>
+            </a:extLst>
+          </p:cNvPr>
+          <p:cNvSpPr txBox="1"/>
+          <p:nvPr/>
+        </p:nvSpPr>
+        <p:spPr>
+          <a:xfrm>
+            <a:off x="4845681" y="2377390"/>
+            <a:ext cx="454740" cy="276999"/>
+          </a:xfrm>
+          <a:prstGeom prst="rect">
+            <a:avLst/>
+          </a:prstGeom>
+          <a:noFill/>
+        </p:spPr>
+        <p:txBody>
+          <a:bodyPr wrap="none" rtlCol="0">
+            <a:spAutoFit/>
+          </a:bodyPr>
+          <a:lstStyle/>
+          <a:p>
+            <a:r>
+              <a:rPr lang="en-US" sz="1200" dirty="0">
+                <a:solidFill>
+                  <a:schemeClr val="bg1"/>
+                </a:solidFill>
+              </a:rPr>
+              <a:t>Tags</a:t>
+            </a:r>
+          </a:p>
+        </p:txBody>
+      </p:sp>
+      <p:sp>
+        <p:nvSpPr>
+          <p:cNvPr id="38" name="Rectangle 37">
+            <a:extLst>
+              <a:ext uri="{FF2B5EF4-FFF2-40B4-BE49-F238E27FC236}">
+                <a16:creationId xmlns:a16="http://schemas.microsoft.com/office/drawing/2014/main" id="{F78685B0-7747-429D-A745-0DD6F71E1F77}"/>
+              </a:ext>
+            </a:extLst>
+          </p:cNvPr>
+          <p:cNvSpPr/>
+          <p:nvPr/>
+        </p:nvSpPr>
+        <p:spPr>
+          <a:xfrm>
+            <a:off x="5401445" y="2368458"/>
+            <a:ext cx="2448399" cy="294863"/>
+          </a:xfrm>
+          <a:prstGeom prst="rect">
+            <a:avLst/>
+          </a:prstGeom>
+          <a:solidFill>
+            <a:schemeClr val="bg1"/>
+          </a:solidFill>
+          <a:ln>
+            <a:solidFill>
+              <a:schemeClr val="tx1"/>
+            </a:solidFill>
+          </a:ln>
+        </p:spPr>
+        <p:style>
+          <a:lnRef idx="2">
+            <a:schemeClr val="accent1">
+              <a:shade val="50000"/>
+            </a:schemeClr>
+          </a:lnRef>
+          <a:fillRef idx="1">
+            <a:schemeClr val="accent1"/>
+          </a:fillRef>
+          <a:effectRef idx="0">
+            <a:schemeClr val="accent1"/>
+          </a:effectRef>
+          <a:fontRef idx="minor">
+            <a:schemeClr val="lt1"/>
+          </a:fontRef>
+        </p:style>
+        <p:txBody>
+          <a:bodyPr rtlCol="0" anchor="ctr"/>
+          <a:lstStyle/>
+          <a:p>
+            <a:pPr algn="ctr"/>
+            <a:endParaRPr lang="en-US"/>
+          </a:p>
+        </p:txBody>
+      </p:sp>
+      <p:sp>
+        <p:nvSpPr>
+          <p:cNvPr id="39" name="TextBox 38">
+            <a:extLst>
+              <a:ext uri="{FF2B5EF4-FFF2-40B4-BE49-F238E27FC236}">
+                <a16:creationId xmlns:a16="http://schemas.microsoft.com/office/drawing/2014/main" id="{CA768BE4-6AAB-4924-A238-5CEADB5F9EC0}"/>
+              </a:ext>
+            </a:extLst>
+          </p:cNvPr>
+          <p:cNvSpPr txBox="1"/>
+          <p:nvPr/>
+        </p:nvSpPr>
+        <p:spPr>
+          <a:xfrm>
+            <a:off x="4846353" y="2836815"/>
+            <a:ext cx="553293" cy="276999"/>
+          </a:xfrm>
+          <a:prstGeom prst="rect">
+            <a:avLst/>
+          </a:prstGeom>
+          <a:noFill/>
+        </p:spPr>
+        <p:txBody>
+          <a:bodyPr wrap="none" rtlCol="0">
+            <a:spAutoFit/>
+          </a:bodyPr>
+          <a:lstStyle/>
+          <a:p>
+            <a:r>
+              <a:rPr lang="en-US" sz="1200" dirty="0">
+                <a:solidFill>
+                  <a:schemeClr val="bg1"/>
+                </a:solidFill>
+              </a:rPr>
+              <a:t>Notes</a:t>
+            </a:r>
+          </a:p>
+        </p:txBody>
+      </p:sp>
+      <p:sp>
+        <p:nvSpPr>
+          <p:cNvPr id="40" name="Rectangle 39">
+            <a:extLst>
+              <a:ext uri="{FF2B5EF4-FFF2-40B4-BE49-F238E27FC236}">
+                <a16:creationId xmlns:a16="http://schemas.microsoft.com/office/drawing/2014/main" id="{C86E249F-35F5-4A09-AB6D-891940AF7133}"/>
+              </a:ext>
+            </a:extLst>
+          </p:cNvPr>
+          <p:cNvSpPr/>
+          <p:nvPr/>
+        </p:nvSpPr>
+        <p:spPr>
+          <a:xfrm>
+            <a:off x="5402117" y="2827883"/>
+            <a:ext cx="2448399" cy="294863"/>
+          </a:xfrm>
+          <a:prstGeom prst="rect">
+            <a:avLst/>
+          </a:prstGeom>
+          <a:solidFill>
+            <a:schemeClr val="bg1"/>
+          </a:solidFill>
+          <a:ln>
+            <a:solidFill>
+              <a:schemeClr val="tx1"/>
+            </a:solidFill>
+          </a:ln>
+        </p:spPr>
+        <p:style>
+          <a:lnRef idx="2">
+            <a:schemeClr val="accent1">
+              <a:shade val="50000"/>
+            </a:schemeClr>
+          </a:lnRef>
+          <a:fillRef idx="1">
+            <a:schemeClr val="accent1"/>
+          </a:fillRef>
+          <a:effectRef idx="0">
+            <a:schemeClr val="accent1"/>
+          </a:effectRef>
+          <a:fontRef idx="minor">
+            <a:schemeClr val="lt1"/>
+          </a:fontRef>
+        </p:style>
+        <p:txBody>
+          <a:bodyPr rtlCol="0" anchor="ctr"/>
+          <a:lstStyle/>
+          <a:p>
+            <a:pPr algn="ctr"/>
+            <a:endParaRPr lang="en-US"/>
+          </a:p>
+        </p:txBody>
+      </p:sp>
+      <p:sp>
+        <p:nvSpPr>
+          <p:cNvPr id="41" name="TextBox 40">
+            <a:extLst>
+              <a:ext uri="{FF2B5EF4-FFF2-40B4-BE49-F238E27FC236}">
+                <a16:creationId xmlns:a16="http://schemas.microsoft.com/office/drawing/2014/main" id="{9E7E7AA0-E0E4-4AA4-B686-1E37F93026A2}"/>
+              </a:ext>
+            </a:extLst>
+          </p:cNvPr>
+          <p:cNvSpPr txBox="1"/>
+          <p:nvPr/>
+        </p:nvSpPr>
+        <p:spPr>
+          <a:xfrm>
+            <a:off x="4843881" y="3232833"/>
+            <a:ext cx="643044" cy="461665"/>
+          </a:xfrm>
+          <a:prstGeom prst="rect">
+            <a:avLst/>
+          </a:prstGeom>
+          <a:noFill/>
+        </p:spPr>
+        <p:txBody>
+          <a:bodyPr wrap="square" rtlCol="0">
+            <a:spAutoFit/>
+          </a:bodyPr>
+          <a:lstStyle/>
+          <a:p>
+            <a:r>
+              <a:rPr lang="en-US" sz="1200" dirty="0">
+                <a:solidFill>
+                  <a:schemeClr val="bg1"/>
+                </a:solidFill>
+              </a:rPr>
+              <a:t>Image URL</a:t>
+            </a:r>
+          </a:p>
+        </p:txBody>
+      </p:sp>
+      <p:sp>
+        <p:nvSpPr>
+          <p:cNvPr id="42" name="Rectangle 41">
+            <a:extLst>
+              <a:ext uri="{FF2B5EF4-FFF2-40B4-BE49-F238E27FC236}">
+                <a16:creationId xmlns:a16="http://schemas.microsoft.com/office/drawing/2014/main" id="{E09B5806-8B84-499B-9DED-8C716FF3E64A}"/>
+              </a:ext>
+            </a:extLst>
+          </p:cNvPr>
+          <p:cNvSpPr/>
+          <p:nvPr/>
+        </p:nvSpPr>
+        <p:spPr>
+          <a:xfrm>
+            <a:off x="5410271" y="3316235"/>
+            <a:ext cx="2448399" cy="294863"/>
+          </a:xfrm>
+          <a:prstGeom prst="rect">
+            <a:avLst/>
+          </a:prstGeom>
+          <a:solidFill>
+            <a:schemeClr val="bg1"/>
+          </a:solidFill>
+          <a:ln>
+            <a:solidFill>
+              <a:schemeClr val="tx1"/>
+            </a:solidFill>
+          </a:ln>
+        </p:spPr>
+        <p:style>
+          <a:lnRef idx="2">
+            <a:schemeClr val="accent1">
+              <a:shade val="50000"/>
+            </a:schemeClr>
+          </a:lnRef>
+          <a:fillRef idx="1">
+            <a:schemeClr val="accent1"/>
+          </a:fillRef>
+          <a:effectRef idx="0">
+            <a:schemeClr val="accent1"/>
+          </a:effectRef>
+          <a:fontRef idx="minor">
+            <a:schemeClr val="lt1"/>
+          </a:fontRef>
+        </p:style>
+        <p:txBody>
+          <a:bodyPr rtlCol="0" anchor="ctr"/>
+          <a:lstStyle/>
+          <a:p>
+            <a:pPr algn="ctr"/>
+            <a:endParaRPr lang="en-US"/>
+          </a:p>
+        </p:txBody>
+      </p:sp>
+      <p:sp>
+        <p:nvSpPr>
+          <p:cNvPr id="11" name="Rectangle 10">
+            <a:extLst>
+              <a:ext uri="{FF2B5EF4-FFF2-40B4-BE49-F238E27FC236}">
+                <a16:creationId xmlns:a16="http://schemas.microsoft.com/office/drawing/2014/main" id="{9BEFC692-E455-4940-A3C9-1FF453FCDDB1}"/>
+              </a:ext>
+            </a:extLst>
+          </p:cNvPr>
+          <p:cNvSpPr/>
+          <p:nvPr/>
+        </p:nvSpPr>
+        <p:spPr>
+          <a:xfrm>
+            <a:off x="5418896" y="6123357"/>
+            <a:ext cx="1119840" cy="305269"/>
+          </a:xfrm>
+          <a:prstGeom prst="rect">
+            <a:avLst/>
+          </a:prstGeom>
+          <a:solidFill>
+            <a:schemeClr val="bg2">
+              <a:lumMod val="90000"/>
+            </a:schemeClr>
+          </a:solidFill>
+          <a:ln>
+            <a:solidFill>
+              <a:schemeClr val="tx1"/>
+            </a:solidFill>
+          </a:ln>
+        </p:spPr>
+        <p:style>
+          <a:lnRef idx="2">
+            <a:schemeClr val="accent1">
+              <a:shade val="50000"/>
+            </a:schemeClr>
+          </a:lnRef>
+          <a:fillRef idx="1">
+            <a:schemeClr val="accent1"/>
+          </a:fillRef>
+          <a:effectRef idx="0">
+            <a:schemeClr val="accent1"/>
+          </a:effectRef>
+          <a:fontRef idx="minor">
+            <a:schemeClr val="lt1"/>
+          </a:fontRef>
+        </p:style>
+        <p:txBody>
+          <a:bodyPr rtlCol="0" anchor="ctr"/>
+          <a:lstStyle/>
+          <a:p>
+            <a:pPr algn="ctr"/>
+            <a:r>
+              <a:rPr lang="en-US" sz="1400" dirty="0">
+                <a:solidFill>
+                  <a:schemeClr val="tx1"/>
+                </a:solidFill>
+              </a:rPr>
+              <a:t>save</a:t>
+            </a:r>
+          </a:p>
+        </p:txBody>
+      </p:sp>
+      <p:sp>
+        <p:nvSpPr>
+          <p:cNvPr id="43" name="Rectangle 42">
+            <a:extLst>
+              <a:ext uri="{FF2B5EF4-FFF2-40B4-BE49-F238E27FC236}">
+                <a16:creationId xmlns:a16="http://schemas.microsoft.com/office/drawing/2014/main" id="{FBE3E050-F154-4559-A9B2-236A007F2AD8}"/>
+              </a:ext>
+            </a:extLst>
+          </p:cNvPr>
+          <p:cNvSpPr/>
+          <p:nvPr/>
+        </p:nvSpPr>
+        <p:spPr>
+          <a:xfrm>
+            <a:off x="6728204" y="6119221"/>
+            <a:ext cx="1119840" cy="305269"/>
+          </a:xfrm>
+          <a:prstGeom prst="rect">
+            <a:avLst/>
+          </a:prstGeom>
+          <a:solidFill>
+            <a:schemeClr val="bg2">
+              <a:lumMod val="90000"/>
+            </a:schemeClr>
+          </a:solidFill>
+          <a:ln>
+            <a:solidFill>
+              <a:schemeClr val="tx1"/>
+            </a:solidFill>
+          </a:ln>
+        </p:spPr>
+        <p:style>
+          <a:lnRef idx="2">
+            <a:schemeClr val="accent1">
+              <a:shade val="50000"/>
+            </a:schemeClr>
+          </a:lnRef>
+          <a:fillRef idx="1">
+            <a:schemeClr val="accent1"/>
+          </a:fillRef>
+          <a:effectRef idx="0">
+            <a:schemeClr val="accent1"/>
+          </a:effectRef>
+          <a:fontRef idx="minor">
+            <a:schemeClr val="lt1"/>
+          </a:fontRef>
+        </p:style>
+        <p:txBody>
+          <a:bodyPr rtlCol="0" anchor="ctr"/>
+          <a:lstStyle/>
+          <a:p>
+            <a:pPr algn="ctr"/>
+            <a:r>
+              <a:rPr lang="en-US" sz="1400" dirty="0">
+                <a:solidFill>
+                  <a:schemeClr val="tx1"/>
+                </a:solidFill>
+              </a:rPr>
+              <a:t>cancel</a:t>
+            </a:r>
+          </a:p>
+        </p:txBody>
+      </p:sp>
+    </p:spTree>
+    <p:extLst>
+      <p:ext uri="{BB962C8B-B14F-4D97-AF65-F5344CB8AC3E}">
+        <p14:creationId xmlns:p14="http://schemas.microsoft.com/office/powerpoint/2010/main" val="525610499"/>
+      </p:ext>
+    </p:extLst>
+  </p:cSld>
+  <p:clrMapOvr>
+    <a:masterClrMapping/>
+  </p:clrMapOvr>
+</p:sld>
+</file>
+
+<file path=ppt/slides/slide4.xml><?xml version="1.0" encoding="utf-8"?>
+<p:sld xmlns:a="http://schemas.openxmlformats.org/drawingml/2006/main" xmlns:r="http://schemas.openxmlformats.org/officeDocument/2006/relationships" xmlns:p="http://schemas.openxmlformats.org/presentationml/2006/main">
+  <p:cSld>
+    <p:spTree>
+      <p:nvGrpSpPr>
+        <p:cNvPr id="1" name=""/>
+        <p:cNvGrpSpPr/>
+        <p:nvPr/>
+      </p:nvGrpSpPr>
+      <p:grpSpPr>
+        <a:xfrm>
+          <a:off x="0" y="0"/>
+          <a:ext cx="0" cy="0"/>
+          <a:chOff x="0" y="0"/>
+          <a:chExt cx="0" cy="0"/>
+        </a:xfrm>
+      </p:grpSpPr>
+      <p:sp>
+        <p:nvSpPr>
+          <p:cNvPr id="2" name="Rectangle 1">
+            <a:extLst>
+              <a:ext uri="{FF2B5EF4-FFF2-40B4-BE49-F238E27FC236}">
+                <a16:creationId xmlns:a16="http://schemas.microsoft.com/office/drawing/2014/main" id="{7FF686F5-6F69-4B1F-9072-4D9B10A9893D}"/>
+              </a:ext>
+            </a:extLst>
+          </p:cNvPr>
+          <p:cNvSpPr/>
+          <p:nvPr/>
+        </p:nvSpPr>
+        <p:spPr>
+          <a:xfrm>
+            <a:off x="707471" y="1280067"/>
+            <a:ext cx="1138107" cy="5405959"/>
+          </a:xfrm>
+          <a:prstGeom prst="rect">
+            <a:avLst/>
+          </a:prstGeom>
+          <a:solidFill>
+            <a:schemeClr val="tx1">
+              <a:lumMod val="75000"/>
+              <a:lumOff val="25000"/>
+            </a:schemeClr>
+          </a:solidFill>
+        </p:spPr>
+        <p:txBody>
+          <a:bodyPr wrap="square">
+            <a:noAutofit/>
+          </a:bodyPr>
+          <a:lstStyle/>
+          <a:p>
+            <a:r>
+              <a:rPr lang="en-US" sz="1000" dirty="0">
+                <a:solidFill>
+                  <a:schemeClr val="bg1"/>
+                </a:solidFill>
+              </a:rPr>
+              <a:t>3dmodels</a:t>
+            </a:r>
+          </a:p>
+          <a:p>
+            <a:r>
+              <a:rPr lang="en-US" sz="1000" dirty="0">
+                <a:solidFill>
+                  <a:schemeClr val="bg1"/>
+                </a:solidFill>
+              </a:rPr>
+              <a:t>active</a:t>
+            </a:r>
+          </a:p>
+          <a:p>
+            <a:r>
+              <a:rPr lang="en-US" sz="1000" dirty="0">
+                <a:solidFill>
+                  <a:schemeClr val="bg1"/>
+                </a:solidFill>
+              </a:rPr>
+              <a:t>activity</a:t>
+            </a:r>
+          </a:p>
+          <a:p>
+            <a:r>
+              <a:rPr lang="en-US" sz="1000" dirty="0" err="1">
+                <a:solidFill>
+                  <a:schemeClr val="bg1"/>
+                </a:solidFill>
+              </a:rPr>
+              <a:t>api</a:t>
+            </a:r>
+            <a:endParaRPr lang="en-US" sz="1000" dirty="0">
+              <a:solidFill>
+                <a:schemeClr val="bg1"/>
+              </a:solidFill>
+            </a:endParaRPr>
+          </a:p>
+          <a:p>
+            <a:r>
+              <a:rPr lang="en-US" sz="1000" dirty="0">
+                <a:solidFill>
+                  <a:schemeClr val="bg1"/>
+                </a:solidFill>
+              </a:rPr>
+              <a:t>architecture  </a:t>
+            </a:r>
+          </a:p>
+          <a:p>
+            <a:r>
+              <a:rPr lang="en-US" sz="1000" dirty="0">
+                <a:solidFill>
+                  <a:schemeClr val="bg1"/>
+                </a:solidFill>
+              </a:rPr>
+              <a:t>art  </a:t>
+            </a:r>
+          </a:p>
+          <a:p>
+            <a:r>
+              <a:rPr lang="en-US" sz="1000" dirty="0">
+                <a:solidFill>
+                  <a:schemeClr val="bg1"/>
+                </a:solidFill>
+              </a:rPr>
+              <a:t>artists  </a:t>
+            </a:r>
+          </a:p>
+          <a:p>
+            <a:r>
+              <a:rPr lang="en-US" sz="1000" dirty="0">
+                <a:solidFill>
+                  <a:schemeClr val="bg1"/>
+                </a:solidFill>
+              </a:rPr>
+              <a:t>audio  </a:t>
+            </a:r>
+          </a:p>
+          <a:p>
+            <a:r>
+              <a:rPr lang="en-US" sz="1000" dirty="0" err="1">
+                <a:solidFill>
+                  <a:schemeClr val="bg1"/>
+                </a:solidFill>
+              </a:rPr>
+              <a:t>aws</a:t>
+            </a:r>
+            <a:r>
+              <a:rPr lang="en-US" sz="1000" dirty="0">
+                <a:solidFill>
+                  <a:schemeClr val="bg1"/>
+                </a:solidFill>
+              </a:rPr>
+              <a:t>  </a:t>
+            </a:r>
+          </a:p>
+          <a:p>
+            <a:r>
+              <a:rPr lang="en-US" sz="1000" dirty="0">
+                <a:solidFill>
+                  <a:schemeClr val="accent1">
+                    <a:lumMod val="40000"/>
+                    <a:lumOff val="60000"/>
+                  </a:schemeClr>
+                </a:solidFill>
+              </a:rPr>
+              <a:t>azure</a:t>
+            </a:r>
+            <a:r>
+              <a:rPr lang="en-US" sz="1000" dirty="0">
+                <a:solidFill>
+                  <a:schemeClr val="bg1"/>
+                </a:solidFill>
+              </a:rPr>
+              <a:t>  </a:t>
+            </a:r>
+          </a:p>
+          <a:p>
+            <a:r>
+              <a:rPr lang="en-US" sz="1000" dirty="0" err="1">
+                <a:solidFill>
+                  <a:schemeClr val="bg1"/>
+                </a:solidFill>
+              </a:rPr>
+              <a:t>battlecards</a:t>
+            </a:r>
+            <a:r>
+              <a:rPr lang="en-US" sz="1000" dirty="0">
+                <a:solidFill>
+                  <a:schemeClr val="bg1"/>
+                </a:solidFill>
+              </a:rPr>
+              <a:t>  </a:t>
+            </a:r>
+          </a:p>
+          <a:p>
+            <a:r>
+              <a:rPr lang="en-US" sz="1000" dirty="0">
+                <a:solidFill>
+                  <a:schemeClr val="bg1"/>
+                </a:solidFill>
+              </a:rPr>
+              <a:t>bits  </a:t>
+            </a:r>
+          </a:p>
+          <a:p>
+            <a:r>
+              <a:rPr lang="en-US" sz="1000" dirty="0">
+                <a:solidFill>
+                  <a:schemeClr val="bg1"/>
+                </a:solidFill>
+              </a:rPr>
+              <a:t>blog  </a:t>
+            </a:r>
+          </a:p>
+          <a:p>
+            <a:r>
+              <a:rPr lang="en-US" sz="1000" dirty="0">
+                <a:solidFill>
+                  <a:schemeClr val="bg1"/>
+                </a:solidFill>
+              </a:rPr>
+              <a:t>bookmarks  </a:t>
+            </a:r>
+          </a:p>
+          <a:p>
+            <a:r>
+              <a:rPr lang="en-US" sz="1000" dirty="0" err="1">
+                <a:solidFill>
+                  <a:schemeClr val="bg1"/>
+                </a:solidFill>
+              </a:rPr>
+              <a:t>boston</a:t>
+            </a:r>
+            <a:r>
+              <a:rPr lang="en-US" sz="1000" dirty="0">
+                <a:solidFill>
+                  <a:schemeClr val="bg1"/>
+                </a:solidFill>
+              </a:rPr>
+              <a:t>  </a:t>
+            </a:r>
+          </a:p>
+          <a:p>
+            <a:r>
+              <a:rPr lang="en-US" sz="1000" dirty="0">
+                <a:solidFill>
+                  <a:schemeClr val="bg1"/>
+                </a:solidFill>
+              </a:rPr>
+              <a:t>calculator  </a:t>
+            </a:r>
+          </a:p>
+          <a:p>
+            <a:r>
+              <a:rPr lang="en-US" sz="1000" dirty="0">
+                <a:solidFill>
+                  <a:schemeClr val="bg1"/>
+                </a:solidFill>
+              </a:rPr>
+              <a:t>cards  </a:t>
+            </a:r>
+          </a:p>
+          <a:p>
+            <a:r>
+              <a:rPr lang="en-US" sz="1000" dirty="0">
+                <a:solidFill>
+                  <a:schemeClr val="bg1"/>
+                </a:solidFill>
+              </a:rPr>
+              <a:t>circuits  </a:t>
+            </a:r>
+          </a:p>
+          <a:p>
+            <a:r>
+              <a:rPr lang="en-US" sz="1000" dirty="0">
+                <a:solidFill>
+                  <a:schemeClr val="accent2">
+                    <a:lumMod val="60000"/>
+                    <a:lumOff val="40000"/>
+                  </a:schemeClr>
+                </a:solidFill>
+              </a:rPr>
+              <a:t>code</a:t>
+            </a:r>
+            <a:r>
+              <a:rPr lang="en-US" sz="1000" dirty="0">
+                <a:solidFill>
+                  <a:schemeClr val="bg1"/>
+                </a:solidFill>
+              </a:rPr>
+              <a:t> </a:t>
+            </a:r>
+          </a:p>
+          <a:p>
+            <a:r>
+              <a:rPr lang="en-US" sz="1000" dirty="0">
+                <a:solidFill>
+                  <a:schemeClr val="bg1"/>
+                </a:solidFill>
+              </a:rPr>
+              <a:t>college  </a:t>
+            </a:r>
+          </a:p>
+          <a:p>
+            <a:r>
+              <a:rPr lang="en-US" sz="1000" dirty="0">
+                <a:solidFill>
+                  <a:schemeClr val="bg1"/>
+                </a:solidFill>
+              </a:rPr>
+              <a:t>color  </a:t>
+            </a:r>
+          </a:p>
+          <a:p>
+            <a:r>
+              <a:rPr lang="en-US" sz="1000" dirty="0">
+                <a:solidFill>
+                  <a:schemeClr val="bg1"/>
+                </a:solidFill>
+              </a:rPr>
+              <a:t>comics  </a:t>
+            </a:r>
+          </a:p>
+          <a:p>
+            <a:r>
+              <a:rPr lang="en-US" sz="1000" dirty="0">
+                <a:solidFill>
+                  <a:schemeClr val="bg1"/>
+                </a:solidFill>
+              </a:rPr>
+              <a:t>compete  </a:t>
+            </a:r>
+          </a:p>
+          <a:p>
+            <a:r>
+              <a:rPr lang="en-US" sz="1000" dirty="0">
+                <a:solidFill>
+                  <a:schemeClr val="bg1"/>
+                </a:solidFill>
+              </a:rPr>
+              <a:t>convert </a:t>
+            </a:r>
+          </a:p>
+          <a:p>
+            <a:r>
+              <a:rPr lang="en-US" sz="1000" dirty="0">
+                <a:solidFill>
+                  <a:schemeClr val="bg1"/>
+                </a:solidFill>
+              </a:rPr>
+              <a:t>corpnet  </a:t>
+            </a:r>
+          </a:p>
+          <a:p>
+            <a:r>
+              <a:rPr lang="en-US" sz="1000" dirty="0" err="1">
+                <a:solidFill>
+                  <a:schemeClr val="bg1"/>
+                </a:solidFill>
+              </a:rPr>
+              <a:t>css</a:t>
+            </a:r>
+            <a:r>
+              <a:rPr lang="en-US" sz="1000" dirty="0">
+                <a:solidFill>
+                  <a:schemeClr val="bg1"/>
+                </a:solidFill>
+              </a:rPr>
+              <a:t>  </a:t>
+            </a:r>
+          </a:p>
+          <a:p>
+            <a:r>
+              <a:rPr lang="en-US" sz="1000" dirty="0">
+                <a:solidFill>
+                  <a:schemeClr val="bg1"/>
+                </a:solidFill>
+              </a:rPr>
+              <a:t>demo  </a:t>
+            </a:r>
+          </a:p>
+          <a:p>
+            <a:r>
+              <a:rPr lang="en-US" sz="1000" dirty="0">
+                <a:solidFill>
+                  <a:schemeClr val="bg1"/>
+                </a:solidFill>
+              </a:rPr>
+              <a:t>design  </a:t>
+            </a:r>
+          </a:p>
+          <a:p>
+            <a:r>
+              <a:rPr lang="en-US" sz="1000" dirty="0" err="1">
+                <a:solidFill>
+                  <a:schemeClr val="accent6">
+                    <a:lumMod val="60000"/>
+                    <a:lumOff val="40000"/>
+                  </a:schemeClr>
+                </a:solidFill>
+              </a:rPr>
+              <a:t>dmscreen</a:t>
+            </a:r>
+            <a:r>
+              <a:rPr lang="en-US" sz="1000" dirty="0">
+                <a:solidFill>
+                  <a:schemeClr val="bg1"/>
+                </a:solidFill>
+              </a:rPr>
+              <a:t>  </a:t>
+            </a:r>
+          </a:p>
+          <a:p>
+            <a:r>
+              <a:rPr lang="en-US" sz="1000" dirty="0" err="1">
+                <a:solidFill>
+                  <a:schemeClr val="bg1"/>
+                </a:solidFill>
+              </a:rPr>
+              <a:t>dnd</a:t>
+            </a:r>
+            <a:r>
+              <a:rPr lang="en-US" sz="1000" dirty="0">
+                <a:solidFill>
+                  <a:schemeClr val="bg1"/>
+                </a:solidFill>
+              </a:rPr>
+              <a:t> </a:t>
+            </a:r>
+          </a:p>
+          <a:p>
+            <a:r>
+              <a:rPr lang="en-US" sz="1000" dirty="0" err="1">
+                <a:solidFill>
+                  <a:schemeClr val="bg1"/>
+                </a:solidFill>
+              </a:rPr>
+              <a:t>ebook</a:t>
+            </a:r>
+            <a:r>
+              <a:rPr lang="en-US" sz="1000" dirty="0">
+                <a:solidFill>
+                  <a:schemeClr val="bg1"/>
+                </a:solidFill>
+              </a:rPr>
+              <a:t>  </a:t>
+            </a:r>
+          </a:p>
+          <a:p>
+            <a:r>
+              <a:rPr lang="en-US" sz="1000" dirty="0" err="1">
+                <a:solidFill>
+                  <a:schemeClr val="bg1"/>
+                </a:solidFill>
+              </a:rPr>
+              <a:t>ebooks</a:t>
+            </a:r>
+            <a:r>
+              <a:rPr lang="en-US" sz="1000" dirty="0">
+                <a:solidFill>
+                  <a:schemeClr val="bg1"/>
+                </a:solidFill>
+              </a:rPr>
+              <a:t>  </a:t>
+            </a:r>
+          </a:p>
+          <a:p>
+            <a:r>
+              <a:rPr lang="en-US" sz="1000" dirty="0">
+                <a:solidFill>
+                  <a:schemeClr val="bg1"/>
+                </a:solidFill>
+              </a:rPr>
+              <a:t>elite </a:t>
+            </a:r>
+          </a:p>
+          <a:p>
+            <a:r>
+              <a:rPr lang="en-US" sz="1000" dirty="0">
+                <a:solidFill>
+                  <a:schemeClr val="bg1"/>
+                </a:solidFill>
+              </a:rPr>
+              <a:t>emoji  </a:t>
+            </a:r>
+          </a:p>
+          <a:p>
+            <a:r>
+              <a:rPr lang="en-US" sz="1000" dirty="0">
+                <a:solidFill>
+                  <a:schemeClr val="bg1"/>
+                </a:solidFill>
+              </a:rPr>
+              <a:t>energy  </a:t>
+            </a:r>
+          </a:p>
+          <a:p>
+            <a:r>
+              <a:rPr lang="en-US" sz="1000" dirty="0" err="1">
+                <a:solidFill>
+                  <a:schemeClr val="bg1"/>
+                </a:solidFill>
+              </a:rPr>
+              <a:t>faq</a:t>
+            </a:r>
+            <a:r>
+              <a:rPr lang="en-US" sz="1000" dirty="0">
+                <a:solidFill>
+                  <a:schemeClr val="bg1"/>
+                </a:solidFill>
+              </a:rPr>
+              <a:t>  </a:t>
+            </a:r>
+          </a:p>
+          <a:p>
+            <a:r>
+              <a:rPr lang="en-US" sz="1000" dirty="0">
+                <a:solidFill>
+                  <a:schemeClr val="bg1"/>
+                </a:solidFill>
+              </a:rPr>
+              <a:t>finance</a:t>
+            </a:r>
+          </a:p>
+          <a:p>
+            <a:r>
+              <a:rPr lang="en-US" sz="1000" dirty="0">
+                <a:solidFill>
+                  <a:schemeClr val="bg1"/>
+                </a:solidFill>
+              </a:rPr>
+              <a:t>fonts</a:t>
+            </a:r>
+          </a:p>
+        </p:txBody>
+      </p:sp>
+      <p:pic>
+        <p:nvPicPr>
+          <p:cNvPr id="4" name="Picture 3" descr="Screen Clipping">
+            <a:extLst>
+              <a:ext uri="{FF2B5EF4-FFF2-40B4-BE49-F238E27FC236}">
+                <a16:creationId xmlns:a16="http://schemas.microsoft.com/office/drawing/2014/main" id="{9AF29DC9-CF24-4B74-93D7-FA98C431237A}"/>
+              </a:ext>
+            </a:extLst>
+          </p:cNvPr>
+          <p:cNvPicPr>
+            <a:picLocks noChangeAspect="1"/>
+          </p:cNvPicPr>
+          <p:nvPr/>
+        </p:nvPicPr>
+        <p:blipFill>
+          <a:blip r:embed="rId2">
+            <a:extLst>
+              <a:ext uri="{28A0092B-C50C-407E-A947-70E740481C1C}">
+                <a14:useLocalDpi xmlns:a14="http://schemas.microsoft.com/office/drawing/2010/main" val="0"/>
+              </a:ext>
+            </a:extLst>
+          </a:blip>
+          <a:stretch>
+            <a:fillRect/>
+          </a:stretch>
+        </p:blipFill>
+        <p:spPr>
+          <a:xfrm>
+            <a:off x="1845578" y="1292543"/>
+            <a:ext cx="6182686" cy="801939"/>
+          </a:xfrm>
+          <a:prstGeom prst="rect">
+            <a:avLst/>
+          </a:prstGeom>
+        </p:spPr>
+      </p:pic>
+      <p:sp>
+        <p:nvSpPr>
+          <p:cNvPr id="5" name="TextBox 4">
+            <a:extLst>
+              <a:ext uri="{FF2B5EF4-FFF2-40B4-BE49-F238E27FC236}">
+                <a16:creationId xmlns:a16="http://schemas.microsoft.com/office/drawing/2014/main" id="{EEDEC38A-C739-4FF6-86B9-441AF66DCE11}"/>
+              </a:ext>
+            </a:extLst>
+          </p:cNvPr>
+          <p:cNvSpPr txBox="1"/>
+          <p:nvPr/>
+        </p:nvSpPr>
+        <p:spPr>
+          <a:xfrm>
+            <a:off x="1845578" y="910735"/>
+            <a:ext cx="6182686" cy="369332"/>
+          </a:xfrm>
+          <a:prstGeom prst="rect">
+            <a:avLst/>
+          </a:prstGeom>
+          <a:noFill/>
+        </p:spPr>
+        <p:txBody>
+          <a:bodyPr wrap="square" rtlCol="0" anchor="ctr">
+            <a:spAutoFit/>
+          </a:bodyPr>
+          <a:lstStyle/>
+          <a:p>
+            <a:pPr algn="r"/>
+            <a:r>
+              <a:rPr lang="en-US" b="1" dirty="0"/>
+              <a:t>my links</a:t>
+            </a:r>
+          </a:p>
+        </p:txBody>
+      </p:sp>
+      <p:sp>
+        <p:nvSpPr>
+          <p:cNvPr id="6" name="Rectangle 5">
+            <a:extLst>
+              <a:ext uri="{FF2B5EF4-FFF2-40B4-BE49-F238E27FC236}">
+                <a16:creationId xmlns:a16="http://schemas.microsoft.com/office/drawing/2014/main" id="{52D98C57-ADCA-44C9-AE34-431FEC147522}"/>
+              </a:ext>
+            </a:extLst>
+          </p:cNvPr>
+          <p:cNvSpPr/>
+          <p:nvPr/>
+        </p:nvSpPr>
+        <p:spPr>
+          <a:xfrm>
+            <a:off x="707471" y="910735"/>
+            <a:ext cx="1138107" cy="411060"/>
+          </a:xfrm>
+          <a:prstGeom prst="rect">
+            <a:avLst/>
+          </a:prstGeom>
+          <a:solidFill>
+            <a:schemeClr val="tx1">
+              <a:lumMod val="75000"/>
+              <a:lumOff val="25000"/>
+            </a:schemeClr>
+          </a:solidFill>
+        </p:spPr>
+        <p:txBody>
+          <a:bodyPr wrap="square">
+            <a:noAutofit/>
+          </a:bodyPr>
+          <a:lstStyle/>
+          <a:p>
+            <a:endParaRPr lang="en-US" sz="1000">
+              <a:solidFill>
+                <a:schemeClr val="bg1"/>
+              </a:solidFill>
+            </a:endParaRPr>
+          </a:p>
+        </p:txBody>
+      </p:sp>
+      <p:pic>
+        <p:nvPicPr>
+          <p:cNvPr id="8" name="Graphic 7" descr="Magnifying glass">
+            <a:extLst>
+              <a:ext uri="{FF2B5EF4-FFF2-40B4-BE49-F238E27FC236}">
+                <a16:creationId xmlns:a16="http://schemas.microsoft.com/office/drawing/2014/main" id="{09DAF7B4-1EDF-4780-B1FB-85109A6863F8}"/>
+              </a:ext>
+            </a:extLst>
+          </p:cNvPr>
+          <p:cNvPicPr>
+            <a:picLocks noChangeAspect="1"/>
+          </p:cNvPicPr>
+          <p:nvPr/>
+        </p:nvPicPr>
+        <p:blipFill>
+          <a:blip r:embed="rId3">
+            <a:extLst>
+              <a:ext uri="{28A0092B-C50C-407E-A947-70E740481C1C}">
+                <a14:useLocalDpi xmlns:a14="http://schemas.microsoft.com/office/drawing/2010/main" val="0"/>
+              </a:ext>
+              <a:ext uri="{96DAC541-7B7A-43D3-8B79-37D633B846F1}">
+                <asvg:svgBlip xmlns:asvg="http://schemas.microsoft.com/office/drawing/2016/SVG/main" r:embed="rId4"/>
+              </a:ext>
+            </a:extLst>
+          </a:blip>
+          <a:stretch>
+            <a:fillRect/>
+          </a:stretch>
+        </p:blipFill>
+        <p:spPr>
+          <a:xfrm>
+            <a:off x="1489748" y="992155"/>
+            <a:ext cx="228600" cy="228600"/>
+          </a:xfrm>
+          <a:prstGeom prst="rect">
+            <a:avLst/>
+          </a:prstGeom>
+        </p:spPr>
+      </p:pic>
+      <p:pic>
+        <p:nvPicPr>
+          <p:cNvPr id="10" name="Picture 9">
+            <a:extLst>
+              <a:ext uri="{FF2B5EF4-FFF2-40B4-BE49-F238E27FC236}">
+                <a16:creationId xmlns:a16="http://schemas.microsoft.com/office/drawing/2014/main" id="{D0C5F0A4-8A50-4C4E-9ED5-03FB81F166BA}"/>
+              </a:ext>
+            </a:extLst>
+          </p:cNvPr>
+          <p:cNvPicPr>
+            <a:picLocks noChangeAspect="1"/>
+          </p:cNvPicPr>
+          <p:nvPr/>
+        </p:nvPicPr>
+        <p:blipFill>
+          <a:blip r:embed="rId5">
+            <a:extLst>
+              <a:ext uri="{28A0092B-C50C-407E-A947-70E740481C1C}">
+                <a14:useLocalDpi xmlns:a14="http://schemas.microsoft.com/office/drawing/2010/main" val="0"/>
+              </a:ext>
+            </a:extLst>
+          </a:blip>
+          <a:stretch>
+            <a:fillRect/>
+          </a:stretch>
+        </p:blipFill>
+        <p:spPr>
+          <a:xfrm>
+            <a:off x="806639" y="992155"/>
+            <a:ext cx="228600" cy="228600"/>
+          </a:xfrm>
+          <a:prstGeom prst="rect">
+            <a:avLst/>
+          </a:prstGeom>
+        </p:spPr>
+      </p:pic>
+      <p:pic>
+        <p:nvPicPr>
+          <p:cNvPr id="14" name="Picture 13" descr="Screen Clipping">
+            <a:extLst>
+              <a:ext uri="{FF2B5EF4-FFF2-40B4-BE49-F238E27FC236}">
+                <a16:creationId xmlns:a16="http://schemas.microsoft.com/office/drawing/2014/main" id="{B809BE7E-7731-49FD-9380-BE663FFA9FFE}"/>
+              </a:ext>
+            </a:extLst>
+          </p:cNvPr>
+          <p:cNvPicPr>
+            <a:picLocks noChangeAspect="1"/>
+          </p:cNvPicPr>
+          <p:nvPr/>
+        </p:nvPicPr>
+        <p:blipFill rotWithShape="1">
+          <a:blip r:embed="rId6">
+            <a:extLst>
+              <a:ext uri="{28A0092B-C50C-407E-A947-70E740481C1C}">
+                <a14:useLocalDpi xmlns:a14="http://schemas.microsoft.com/office/drawing/2010/main" val="0"/>
+              </a:ext>
+            </a:extLst>
+          </a:blip>
+          <a:srcRect b="4738"/>
+          <a:stretch/>
+        </p:blipFill>
+        <p:spPr>
+          <a:xfrm>
+            <a:off x="2025797" y="2890607"/>
+            <a:ext cx="1828800" cy="3795419"/>
+          </a:xfrm>
+          <a:prstGeom prst="rect">
+            <a:avLst/>
+          </a:prstGeom>
+        </p:spPr>
+      </p:pic>
+      <p:pic>
+        <p:nvPicPr>
+          <p:cNvPr id="16" name="Picture 15" descr="Screen Clipping">
+            <a:extLst>
+              <a:ext uri="{FF2B5EF4-FFF2-40B4-BE49-F238E27FC236}">
+                <a16:creationId xmlns:a16="http://schemas.microsoft.com/office/drawing/2014/main" id="{7B141C36-0BCC-4311-9BB5-D2F52039442D}"/>
+              </a:ext>
+            </a:extLst>
+          </p:cNvPr>
+          <p:cNvPicPr>
+            <a:picLocks noChangeAspect="1"/>
+          </p:cNvPicPr>
+          <p:nvPr/>
+        </p:nvPicPr>
+        <p:blipFill rotWithShape="1">
+          <a:blip r:embed="rId7">
+            <a:extLst>
+              <a:ext uri="{28A0092B-C50C-407E-A947-70E740481C1C}">
+                <a14:useLocalDpi xmlns:a14="http://schemas.microsoft.com/office/drawing/2010/main" val="0"/>
+              </a:ext>
+            </a:extLst>
+          </a:blip>
+          <a:srcRect b="5239"/>
+          <a:stretch/>
+        </p:blipFill>
+        <p:spPr>
+          <a:xfrm>
+            <a:off x="4007146" y="2890607"/>
+            <a:ext cx="1828800" cy="3442448"/>
+          </a:xfrm>
+          <a:prstGeom prst="rect">
+            <a:avLst/>
+          </a:prstGeom>
+        </p:spPr>
+      </p:pic>
+      <p:sp>
+        <p:nvSpPr>
+          <p:cNvPr id="17" name="TextBox 16">
+            <a:extLst>
+              <a:ext uri="{FF2B5EF4-FFF2-40B4-BE49-F238E27FC236}">
+                <a16:creationId xmlns:a16="http://schemas.microsoft.com/office/drawing/2014/main" id="{D020BD92-32A2-4F20-9D8A-14956D882287}"/>
+              </a:ext>
+            </a:extLst>
+          </p:cNvPr>
+          <p:cNvSpPr txBox="1"/>
+          <p:nvPr/>
+        </p:nvSpPr>
+        <p:spPr>
+          <a:xfrm>
+            <a:off x="2025798" y="2332522"/>
+            <a:ext cx="1828800" cy="369332"/>
+          </a:xfrm>
+          <a:prstGeom prst="rect">
+            <a:avLst/>
+          </a:prstGeom>
+          <a:noFill/>
+        </p:spPr>
+        <p:txBody>
+          <a:bodyPr wrap="square" rtlCol="0" anchor="ctr">
+            <a:spAutoFit/>
+          </a:bodyPr>
+          <a:lstStyle/>
+          <a:p>
+            <a:r>
+              <a:rPr lang="en-US" b="1" dirty="0" err="1"/>
+              <a:t>dnd</a:t>
+            </a:r>
+            <a:endParaRPr lang="en-US" b="1" dirty="0"/>
+          </a:p>
+        </p:txBody>
+      </p:sp>
+      <p:sp>
+        <p:nvSpPr>
+          <p:cNvPr id="18" name="TextBox 17">
+            <a:extLst>
+              <a:ext uri="{FF2B5EF4-FFF2-40B4-BE49-F238E27FC236}">
+                <a16:creationId xmlns:a16="http://schemas.microsoft.com/office/drawing/2014/main" id="{7DD97B8E-B7A2-49F2-990B-DBF22FEA67C8}"/>
+              </a:ext>
+            </a:extLst>
+          </p:cNvPr>
+          <p:cNvSpPr txBox="1"/>
+          <p:nvPr/>
+        </p:nvSpPr>
+        <p:spPr>
+          <a:xfrm>
+            <a:off x="3915497" y="2332522"/>
+            <a:ext cx="1920450" cy="369332"/>
+          </a:xfrm>
+          <a:prstGeom prst="rect">
+            <a:avLst/>
+          </a:prstGeom>
+          <a:noFill/>
+        </p:spPr>
+        <p:txBody>
+          <a:bodyPr wrap="square" rtlCol="0" anchor="ctr">
+            <a:spAutoFit/>
+          </a:bodyPr>
+          <a:lstStyle/>
+          <a:p>
+            <a:r>
+              <a:rPr lang="en-US" b="1" dirty="0"/>
+              <a:t>recent-visits</a:t>
+            </a:r>
+          </a:p>
+        </p:txBody>
+      </p:sp>
+      <p:pic>
+        <p:nvPicPr>
+          <p:cNvPr id="19" name="Picture 18" descr="Screen Clipping">
+            <a:extLst>
+              <a:ext uri="{FF2B5EF4-FFF2-40B4-BE49-F238E27FC236}">
+                <a16:creationId xmlns:a16="http://schemas.microsoft.com/office/drawing/2014/main" id="{9901026C-A7FB-487A-94CF-705CB218C346}"/>
+              </a:ext>
+            </a:extLst>
+          </p:cNvPr>
+          <p:cNvPicPr>
+            <a:picLocks noChangeAspect="1"/>
+          </p:cNvPicPr>
+          <p:nvPr/>
+        </p:nvPicPr>
+        <p:blipFill rotWithShape="1">
+          <a:blip r:embed="rId7">
+            <a:extLst>
+              <a:ext uri="{28A0092B-C50C-407E-A947-70E740481C1C}">
+                <a14:useLocalDpi xmlns:a14="http://schemas.microsoft.com/office/drawing/2010/main" val="0"/>
+              </a:ext>
+            </a:extLst>
+          </a:blip>
+          <a:srcRect b="5314"/>
+          <a:stretch/>
+        </p:blipFill>
+        <p:spPr>
+          <a:xfrm>
+            <a:off x="5988493" y="2890607"/>
+            <a:ext cx="1828800" cy="3439736"/>
+          </a:xfrm>
+          <a:prstGeom prst="rect">
+            <a:avLst/>
+          </a:prstGeom>
+        </p:spPr>
+      </p:pic>
+      <p:sp>
+        <p:nvSpPr>
+          <p:cNvPr id="21" name="Rectangle 20">
+            <a:extLst>
+              <a:ext uri="{FF2B5EF4-FFF2-40B4-BE49-F238E27FC236}">
+                <a16:creationId xmlns:a16="http://schemas.microsoft.com/office/drawing/2014/main" id="{A47C786E-6AA6-4835-9930-B3DB83FDFEA0}"/>
+              </a:ext>
+            </a:extLst>
+          </p:cNvPr>
+          <p:cNvSpPr/>
+          <p:nvPr/>
+        </p:nvSpPr>
+        <p:spPr>
+          <a:xfrm>
+            <a:off x="8703578" y="1124654"/>
+            <a:ext cx="2663505" cy="411060"/>
+          </a:xfrm>
+          <a:prstGeom prst="rect">
+            <a:avLst/>
+          </a:prstGeom>
+          <a:solidFill>
+            <a:schemeClr val="tx1">
+              <a:lumMod val="75000"/>
+              <a:lumOff val="25000"/>
+            </a:schemeClr>
+          </a:solidFill>
+        </p:spPr>
+        <p:txBody>
+          <a:bodyPr wrap="square">
+            <a:noAutofit/>
+          </a:bodyPr>
+          <a:lstStyle/>
+          <a:p>
+            <a:endParaRPr lang="en-US" sz="1000">
+              <a:solidFill>
+                <a:schemeClr val="bg1"/>
+              </a:solidFill>
+            </a:endParaRPr>
+          </a:p>
+        </p:txBody>
+      </p:sp>
+      <p:pic>
+        <p:nvPicPr>
+          <p:cNvPr id="22" name="Graphic 21" descr="Magnifying glass">
+            <a:extLst>
+              <a:ext uri="{FF2B5EF4-FFF2-40B4-BE49-F238E27FC236}">
+                <a16:creationId xmlns:a16="http://schemas.microsoft.com/office/drawing/2014/main" id="{503A6989-CF6B-475B-B4C2-991DB2E85D5A}"/>
+              </a:ext>
+            </a:extLst>
+          </p:cNvPr>
+          <p:cNvPicPr>
+            <a:picLocks noChangeAspect="1"/>
+          </p:cNvPicPr>
+          <p:nvPr/>
+        </p:nvPicPr>
+        <p:blipFill>
+          <a:blip r:embed="rId3">
+            <a:extLst>
+              <a:ext uri="{28A0092B-C50C-407E-A947-70E740481C1C}">
+                <a14:useLocalDpi xmlns:a14="http://schemas.microsoft.com/office/drawing/2010/main" val="0"/>
+              </a:ext>
+              <a:ext uri="{96DAC541-7B7A-43D3-8B79-37D633B846F1}">
+                <asvg:svgBlip xmlns:asvg="http://schemas.microsoft.com/office/drawing/2016/SVG/main" r:embed="rId4"/>
+              </a:ext>
+            </a:extLst>
+          </a:blip>
+          <a:stretch>
+            <a:fillRect/>
+          </a:stretch>
+        </p:blipFill>
+        <p:spPr>
+          <a:xfrm>
+            <a:off x="11012652" y="1206074"/>
+            <a:ext cx="228600" cy="228600"/>
+          </a:xfrm>
+          <a:prstGeom prst="rect">
+            <a:avLst/>
+          </a:prstGeom>
+        </p:spPr>
+      </p:pic>
+      <p:pic>
+        <p:nvPicPr>
+          <p:cNvPr id="23" name="Picture 22">
+            <a:extLst>
+              <a:ext uri="{FF2B5EF4-FFF2-40B4-BE49-F238E27FC236}">
+                <a16:creationId xmlns:a16="http://schemas.microsoft.com/office/drawing/2014/main" id="{1E1A6C70-27BC-402B-96F1-0E0B0811C207}"/>
+              </a:ext>
+            </a:extLst>
+          </p:cNvPr>
+          <p:cNvPicPr>
+            <a:picLocks noChangeAspect="1"/>
+          </p:cNvPicPr>
+          <p:nvPr/>
+        </p:nvPicPr>
+        <p:blipFill>
+          <a:blip r:embed="rId5">
+            <a:extLst>
+              <a:ext uri="{28A0092B-C50C-407E-A947-70E740481C1C}">
+                <a14:useLocalDpi xmlns:a14="http://schemas.microsoft.com/office/drawing/2010/main" val="0"/>
+              </a:ext>
+            </a:extLst>
+          </a:blip>
+          <a:stretch>
+            <a:fillRect/>
+          </a:stretch>
+        </p:blipFill>
+        <p:spPr>
+          <a:xfrm>
+            <a:off x="8802746" y="1206074"/>
+            <a:ext cx="228600" cy="228600"/>
+          </a:xfrm>
+          <a:prstGeom prst="rect">
+            <a:avLst/>
+          </a:prstGeom>
+        </p:spPr>
+      </p:pic>
+      <p:pic>
+        <p:nvPicPr>
+          <p:cNvPr id="24" name="Picture 23" descr="Screen Clipping">
+            <a:extLst>
+              <a:ext uri="{FF2B5EF4-FFF2-40B4-BE49-F238E27FC236}">
+                <a16:creationId xmlns:a16="http://schemas.microsoft.com/office/drawing/2014/main" id="{4B28A496-93F4-4129-8B7C-CE227CC501E0}"/>
+              </a:ext>
+            </a:extLst>
+          </p:cNvPr>
+          <p:cNvPicPr>
+            <a:picLocks noChangeAspect="1"/>
+          </p:cNvPicPr>
+          <p:nvPr/>
+        </p:nvPicPr>
+        <p:blipFill rotWithShape="1">
+          <a:blip r:embed="rId2">
+            <a:extLst>
+              <a:ext uri="{28A0092B-C50C-407E-A947-70E740481C1C}">
+                <a14:useLocalDpi xmlns:a14="http://schemas.microsoft.com/office/drawing/2010/main" val="0"/>
+              </a:ext>
+            </a:extLst>
+          </a:blip>
+          <a:srcRect r="57768"/>
+          <a:stretch/>
+        </p:blipFill>
+        <p:spPr>
+          <a:xfrm>
+            <a:off x="8729216" y="1886567"/>
+            <a:ext cx="2611053" cy="801939"/>
+          </a:xfrm>
+          <a:prstGeom prst="rect">
+            <a:avLst/>
+          </a:prstGeom>
+        </p:spPr>
+      </p:pic>
+      <p:pic>
+        <p:nvPicPr>
+          <p:cNvPr id="25" name="Picture 24" descr="Screen Clipping">
+            <a:extLst>
+              <a:ext uri="{FF2B5EF4-FFF2-40B4-BE49-F238E27FC236}">
+                <a16:creationId xmlns:a16="http://schemas.microsoft.com/office/drawing/2014/main" id="{3C8AE91D-2B35-4007-A957-804E88515AA7}"/>
+              </a:ext>
+            </a:extLst>
+          </p:cNvPr>
+          <p:cNvPicPr>
+            <a:picLocks noChangeAspect="1"/>
+          </p:cNvPicPr>
+          <p:nvPr/>
+        </p:nvPicPr>
+        <p:blipFill rotWithShape="1">
+          <a:blip r:embed="rId2">
+            <a:extLst>
+              <a:ext uri="{28A0092B-C50C-407E-A947-70E740481C1C}">
+                <a14:useLocalDpi xmlns:a14="http://schemas.microsoft.com/office/drawing/2010/main" val="0"/>
+              </a:ext>
+            </a:extLst>
+          </a:blip>
+          <a:srcRect l="43051" r="14441"/>
+          <a:stretch/>
+        </p:blipFill>
+        <p:spPr>
+          <a:xfrm>
+            <a:off x="8703578" y="2732103"/>
+            <a:ext cx="2628146" cy="801939"/>
+          </a:xfrm>
+          <a:prstGeom prst="rect">
+            <a:avLst/>
+          </a:prstGeom>
+        </p:spPr>
+      </p:pic>
+      <p:pic>
+        <p:nvPicPr>
+          <p:cNvPr id="26" name="Picture 25" descr="Screen Clipping">
+            <a:extLst>
+              <a:ext uri="{FF2B5EF4-FFF2-40B4-BE49-F238E27FC236}">
+                <a16:creationId xmlns:a16="http://schemas.microsoft.com/office/drawing/2014/main" id="{9D72E4B2-58AE-43AB-915B-BDF1EEEC5D7D}"/>
+              </a:ext>
+            </a:extLst>
+          </p:cNvPr>
+          <p:cNvPicPr>
+            <a:picLocks noChangeAspect="1"/>
+          </p:cNvPicPr>
+          <p:nvPr/>
+        </p:nvPicPr>
+        <p:blipFill rotWithShape="1">
+          <a:blip r:embed="rId2">
+            <a:extLst>
+              <a:ext uri="{28A0092B-C50C-407E-A947-70E740481C1C}">
+                <a14:useLocalDpi xmlns:a14="http://schemas.microsoft.com/office/drawing/2010/main" val="0"/>
+              </a:ext>
+            </a:extLst>
+          </a:blip>
+          <a:srcRect l="87102"/>
+          <a:stretch/>
+        </p:blipFill>
+        <p:spPr>
+          <a:xfrm>
+            <a:off x="8729215" y="3575068"/>
+            <a:ext cx="797411" cy="801939"/>
+          </a:xfrm>
+          <a:prstGeom prst="rect">
+            <a:avLst/>
+          </a:prstGeom>
+        </p:spPr>
+      </p:pic>
+      <p:sp>
+        <p:nvSpPr>
+          <p:cNvPr id="27" name="TextBox 26">
+            <a:extLst>
+              <a:ext uri="{FF2B5EF4-FFF2-40B4-BE49-F238E27FC236}">
+                <a16:creationId xmlns:a16="http://schemas.microsoft.com/office/drawing/2014/main" id="{9809BF05-4CB7-4F5A-97EA-B88A8E1AD922}"/>
+              </a:ext>
+            </a:extLst>
+          </p:cNvPr>
+          <p:cNvSpPr txBox="1"/>
+          <p:nvPr/>
+        </p:nvSpPr>
+        <p:spPr>
+          <a:xfrm>
+            <a:off x="8729214" y="1517235"/>
+            <a:ext cx="2602509" cy="369332"/>
+          </a:xfrm>
+          <a:prstGeom prst="rect">
+            <a:avLst/>
+          </a:prstGeom>
+          <a:noFill/>
+        </p:spPr>
+        <p:txBody>
+          <a:bodyPr wrap="square" rtlCol="0" anchor="ctr">
+            <a:spAutoFit/>
+          </a:bodyPr>
+          <a:lstStyle/>
+          <a:p>
+            <a:pPr algn="r"/>
+            <a:r>
+              <a:rPr lang="en-US" b="1" dirty="0"/>
+              <a:t>my links</a:t>
+            </a:r>
+          </a:p>
+        </p:txBody>
+      </p:sp>
+      <p:sp>
+        <p:nvSpPr>
+          <p:cNvPr id="29" name="TextBox 28">
+            <a:extLst>
+              <a:ext uri="{FF2B5EF4-FFF2-40B4-BE49-F238E27FC236}">
+                <a16:creationId xmlns:a16="http://schemas.microsoft.com/office/drawing/2014/main" id="{9DD355AC-0E70-49FD-9DB7-66D96B2928F0}"/>
+              </a:ext>
+            </a:extLst>
+          </p:cNvPr>
+          <p:cNvSpPr txBox="1"/>
+          <p:nvPr/>
+        </p:nvSpPr>
+        <p:spPr>
+          <a:xfrm>
+            <a:off x="8729212" y="4418033"/>
+            <a:ext cx="2602509" cy="369332"/>
+          </a:xfrm>
+          <a:prstGeom prst="rect">
+            <a:avLst/>
+          </a:prstGeom>
+          <a:noFill/>
+        </p:spPr>
+        <p:txBody>
+          <a:bodyPr wrap="square" rtlCol="0" anchor="ctr">
+            <a:spAutoFit/>
+          </a:bodyPr>
+          <a:lstStyle/>
+          <a:p>
+            <a:r>
+              <a:rPr lang="en-US" b="1" dirty="0" err="1"/>
+              <a:t>dnd</a:t>
+            </a:r>
+            <a:r>
+              <a:rPr lang="en-US" b="1" dirty="0"/>
+              <a:t> …</a:t>
+            </a:r>
+          </a:p>
+        </p:txBody>
+      </p:sp>
+      <p:sp>
+        <p:nvSpPr>
+          <p:cNvPr id="30" name="TextBox 29">
+            <a:extLst>
+              <a:ext uri="{FF2B5EF4-FFF2-40B4-BE49-F238E27FC236}">
+                <a16:creationId xmlns:a16="http://schemas.microsoft.com/office/drawing/2014/main" id="{D5BBDF26-D750-4BC7-B6EF-899B7C8DDBF3}"/>
+              </a:ext>
+            </a:extLst>
+          </p:cNvPr>
+          <p:cNvSpPr txBox="1"/>
+          <p:nvPr/>
+        </p:nvSpPr>
+        <p:spPr>
+          <a:xfrm>
+            <a:off x="8729212" y="4767660"/>
+            <a:ext cx="2602509" cy="369332"/>
+          </a:xfrm>
+          <a:prstGeom prst="rect">
+            <a:avLst/>
+          </a:prstGeom>
+          <a:noFill/>
+        </p:spPr>
+        <p:txBody>
+          <a:bodyPr wrap="square" rtlCol="0" anchor="ctr">
+            <a:spAutoFit/>
+          </a:bodyPr>
+          <a:lstStyle/>
+          <a:p>
+            <a:r>
+              <a:rPr lang="en-US" b="1" dirty="0"/>
+              <a:t>recent-visits …</a:t>
+            </a:r>
+          </a:p>
+        </p:txBody>
+      </p:sp>
+      <p:sp>
+        <p:nvSpPr>
+          <p:cNvPr id="31" name="TextBox 30">
+            <a:extLst>
+              <a:ext uri="{FF2B5EF4-FFF2-40B4-BE49-F238E27FC236}">
+                <a16:creationId xmlns:a16="http://schemas.microsoft.com/office/drawing/2014/main" id="{2A1F03F8-B5BA-4C54-A753-8B5CF3B95F66}"/>
+              </a:ext>
+            </a:extLst>
+          </p:cNvPr>
+          <p:cNvSpPr txBox="1"/>
+          <p:nvPr/>
+        </p:nvSpPr>
+        <p:spPr>
+          <a:xfrm>
+            <a:off x="8729212" y="5117288"/>
+            <a:ext cx="2602509" cy="369332"/>
+          </a:xfrm>
+          <a:prstGeom prst="rect">
+            <a:avLst/>
+          </a:prstGeom>
+          <a:noFill/>
+        </p:spPr>
+        <p:txBody>
+          <a:bodyPr wrap="square" rtlCol="0" anchor="ctr">
+            <a:spAutoFit/>
+          </a:bodyPr>
+          <a:lstStyle/>
+          <a:p>
+            <a:r>
+              <a:rPr lang="en-US" b="1" dirty="0"/>
+              <a:t>another-pin …</a:t>
+            </a:r>
+          </a:p>
+        </p:txBody>
+      </p:sp>
+      <p:pic>
+        <p:nvPicPr>
+          <p:cNvPr id="32" name="Picture 31" descr="Screen Clipping">
+            <a:extLst>
+              <a:ext uri="{FF2B5EF4-FFF2-40B4-BE49-F238E27FC236}">
+                <a16:creationId xmlns:a16="http://schemas.microsoft.com/office/drawing/2014/main" id="{30D28E44-C964-4CEE-8171-21288A13A445}"/>
+              </a:ext>
+            </a:extLst>
+          </p:cNvPr>
+          <p:cNvPicPr>
+            <a:picLocks noChangeAspect="1"/>
+          </p:cNvPicPr>
+          <p:nvPr/>
+        </p:nvPicPr>
+        <p:blipFill rotWithShape="1">
+          <a:blip r:embed="rId7">
+            <a:extLst>
+              <a:ext uri="{28A0092B-C50C-407E-A947-70E740481C1C}">
+                <a14:useLocalDpi xmlns:a14="http://schemas.microsoft.com/office/drawing/2010/main" val="0"/>
+              </a:ext>
+            </a:extLst>
+          </a:blip>
+          <a:srcRect t="94393"/>
+          <a:stretch/>
+        </p:blipFill>
+        <p:spPr>
+          <a:xfrm>
+            <a:off x="3997680" y="2685076"/>
+            <a:ext cx="1828800" cy="203675"/>
+          </a:xfrm>
+          <a:prstGeom prst="rect">
+            <a:avLst/>
+          </a:prstGeom>
+        </p:spPr>
+      </p:pic>
+      <p:pic>
+        <p:nvPicPr>
+          <p:cNvPr id="34" name="Picture 33" descr="Screen Clipping">
+            <a:extLst>
+              <a:ext uri="{FF2B5EF4-FFF2-40B4-BE49-F238E27FC236}">
+                <a16:creationId xmlns:a16="http://schemas.microsoft.com/office/drawing/2014/main" id="{7DBB007E-0972-4465-BDA9-5351A9DF50F3}"/>
+              </a:ext>
+            </a:extLst>
+          </p:cNvPr>
+          <p:cNvPicPr>
+            <a:picLocks noChangeAspect="1"/>
+          </p:cNvPicPr>
+          <p:nvPr/>
+        </p:nvPicPr>
+        <p:blipFill rotWithShape="1">
+          <a:blip r:embed="rId7">
+            <a:extLst>
+              <a:ext uri="{28A0092B-C50C-407E-A947-70E740481C1C}">
+                <a14:useLocalDpi xmlns:a14="http://schemas.microsoft.com/office/drawing/2010/main" val="0"/>
+              </a:ext>
+            </a:extLst>
+          </a:blip>
+          <a:srcRect t="94393"/>
+          <a:stretch/>
+        </p:blipFill>
+        <p:spPr>
+          <a:xfrm>
+            <a:off x="2009345" y="2685076"/>
+            <a:ext cx="1828800" cy="203675"/>
+          </a:xfrm>
+          <a:prstGeom prst="rect">
+            <a:avLst/>
+          </a:prstGeom>
+        </p:spPr>
+      </p:pic>
+      <p:sp>
+        <p:nvSpPr>
+          <p:cNvPr id="20" name="TextBox 19">
+            <a:extLst>
+              <a:ext uri="{FF2B5EF4-FFF2-40B4-BE49-F238E27FC236}">
+                <a16:creationId xmlns:a16="http://schemas.microsoft.com/office/drawing/2014/main" id="{43BF1CDE-0F62-4B46-8114-A66595E34AE7}"/>
+              </a:ext>
+            </a:extLst>
+          </p:cNvPr>
+          <p:cNvSpPr txBox="1"/>
+          <p:nvPr/>
+        </p:nvSpPr>
+        <p:spPr>
+          <a:xfrm>
+            <a:off x="5896843" y="2315744"/>
+            <a:ext cx="1920450" cy="369332"/>
+          </a:xfrm>
+          <a:prstGeom prst="rect">
+            <a:avLst/>
+          </a:prstGeom>
+          <a:noFill/>
+        </p:spPr>
+        <p:txBody>
+          <a:bodyPr wrap="square" rtlCol="0" anchor="ctr">
+            <a:spAutoFit/>
+          </a:bodyPr>
+          <a:lstStyle/>
+          <a:p>
+            <a:r>
+              <a:rPr lang="en-US" b="1" dirty="0"/>
+              <a:t>another-pin</a:t>
+            </a:r>
+          </a:p>
+        </p:txBody>
+      </p:sp>
+      <p:pic>
+        <p:nvPicPr>
+          <p:cNvPr id="33" name="Picture 32" descr="Screen Clipping">
+            <a:extLst>
+              <a:ext uri="{FF2B5EF4-FFF2-40B4-BE49-F238E27FC236}">
+                <a16:creationId xmlns:a16="http://schemas.microsoft.com/office/drawing/2014/main" id="{FF0D9B96-C410-4BC9-8F17-6A1906DDDA82}"/>
+              </a:ext>
+            </a:extLst>
+          </p:cNvPr>
+          <p:cNvPicPr>
+            <a:picLocks noChangeAspect="1"/>
+          </p:cNvPicPr>
+          <p:nvPr/>
+        </p:nvPicPr>
+        <p:blipFill rotWithShape="1">
+          <a:blip r:embed="rId7">
+            <a:extLst>
+              <a:ext uri="{28A0092B-C50C-407E-A947-70E740481C1C}">
+                <a14:useLocalDpi xmlns:a14="http://schemas.microsoft.com/office/drawing/2010/main" val="0"/>
+              </a:ext>
+            </a:extLst>
+          </a:blip>
+          <a:srcRect t="94393"/>
+          <a:stretch/>
+        </p:blipFill>
+        <p:spPr>
+          <a:xfrm>
+            <a:off x="5955263" y="2668298"/>
+            <a:ext cx="1828800" cy="203675"/>
+          </a:xfrm>
+          <a:prstGeom prst="rect">
+            <a:avLst/>
+          </a:prstGeom>
+        </p:spPr>
+      </p:pic>
+      <p:sp>
+        <p:nvSpPr>
+          <p:cNvPr id="28" name="Rectangle 27">
+            <a:extLst>
+              <a:ext uri="{FF2B5EF4-FFF2-40B4-BE49-F238E27FC236}">
+                <a16:creationId xmlns:a16="http://schemas.microsoft.com/office/drawing/2014/main" id="{87A6A00F-703B-4767-830A-A851FA2BB872}"/>
+              </a:ext>
+            </a:extLst>
+          </p:cNvPr>
+          <p:cNvSpPr/>
+          <p:nvPr/>
+        </p:nvSpPr>
+        <p:spPr>
+          <a:xfrm>
+            <a:off x="2022623" y="3343085"/>
+            <a:ext cx="1831974" cy="1866478"/>
+          </a:xfrm>
+          <a:prstGeom prst="rect">
+            <a:avLst/>
+          </a:prstGeom>
+          <a:solidFill>
+            <a:schemeClr val="bg1">
+              <a:lumMod val="85000"/>
+            </a:schemeClr>
+          </a:solidFill>
+        </p:spPr>
+        <p:txBody>
+          <a:bodyPr wrap="square">
+            <a:noAutofit/>
+          </a:bodyPr>
+          <a:lstStyle/>
+          <a:p>
+            <a:endParaRPr lang="en-US" b="1" dirty="0">
+              <a:solidFill>
+                <a:schemeClr val="bg1"/>
+              </a:solidFill>
+            </a:endParaRPr>
+          </a:p>
+        </p:txBody>
+      </p:sp>
+      <p:sp>
+        <p:nvSpPr>
+          <p:cNvPr id="7" name="TextBox 6">
+            <a:extLst>
+              <a:ext uri="{FF2B5EF4-FFF2-40B4-BE49-F238E27FC236}">
+                <a16:creationId xmlns:a16="http://schemas.microsoft.com/office/drawing/2014/main" id="{C802180F-E8E3-494E-969E-93DF59158ED1}"/>
+              </a:ext>
+            </a:extLst>
+          </p:cNvPr>
+          <p:cNvSpPr txBox="1"/>
+          <p:nvPr/>
+        </p:nvSpPr>
+        <p:spPr>
+          <a:xfrm>
+            <a:off x="2003215" y="3421362"/>
+            <a:ext cx="391454" cy="230832"/>
+          </a:xfrm>
+          <a:prstGeom prst="rect">
+            <a:avLst/>
+          </a:prstGeom>
+          <a:noFill/>
+        </p:spPr>
+        <p:txBody>
+          <a:bodyPr wrap="none" rtlCol="0">
+            <a:spAutoFit/>
+          </a:bodyPr>
+          <a:lstStyle/>
+          <a:p>
+            <a:r>
+              <a:rPr lang="en-US" sz="900" dirty="0"/>
+              <a:t>Title</a:t>
+            </a:r>
+          </a:p>
+        </p:txBody>
+      </p:sp>
+      <p:sp>
+        <p:nvSpPr>
+          <p:cNvPr id="9" name="Rectangle 8">
+            <a:extLst>
+              <a:ext uri="{FF2B5EF4-FFF2-40B4-BE49-F238E27FC236}">
+                <a16:creationId xmlns:a16="http://schemas.microsoft.com/office/drawing/2014/main" id="{F6D56084-D140-47D1-A518-5162E88E6B8A}"/>
+              </a:ext>
+            </a:extLst>
+          </p:cNvPr>
+          <p:cNvSpPr/>
+          <p:nvPr/>
+        </p:nvSpPr>
+        <p:spPr>
+          <a:xfrm>
+            <a:off x="2522555" y="3432637"/>
+            <a:ext cx="1244103" cy="197426"/>
+          </a:xfrm>
+          <a:prstGeom prst="rect">
+            <a:avLst/>
+          </a:prstGeom>
+          <a:solidFill>
+            <a:schemeClr val="bg1"/>
+          </a:solidFill>
+          <a:ln>
+            <a:solidFill>
+              <a:schemeClr val="tx1"/>
+            </a:solidFill>
+          </a:ln>
+        </p:spPr>
+        <p:style>
+          <a:lnRef idx="2">
+            <a:schemeClr val="accent1">
+              <a:shade val="50000"/>
+            </a:schemeClr>
+          </a:lnRef>
+          <a:fillRef idx="1">
+            <a:schemeClr val="accent1"/>
+          </a:fillRef>
+          <a:effectRef idx="0">
+            <a:schemeClr val="accent1"/>
+          </a:effectRef>
+          <a:fontRef idx="minor">
+            <a:schemeClr val="lt1"/>
+          </a:fontRef>
+        </p:style>
+        <p:txBody>
+          <a:bodyPr rtlCol="0" anchor="ctr"/>
+          <a:lstStyle/>
+          <a:p>
+            <a:pPr algn="ctr"/>
+            <a:endParaRPr lang="en-US"/>
+          </a:p>
+        </p:txBody>
+      </p:sp>
+      <p:sp>
+        <p:nvSpPr>
+          <p:cNvPr id="35" name="TextBox 34">
+            <a:extLst>
+              <a:ext uri="{FF2B5EF4-FFF2-40B4-BE49-F238E27FC236}">
+                <a16:creationId xmlns:a16="http://schemas.microsoft.com/office/drawing/2014/main" id="{CA60BE18-860F-44C5-B42D-252056FAF2F7}"/>
+              </a:ext>
+            </a:extLst>
+          </p:cNvPr>
+          <p:cNvSpPr txBox="1"/>
+          <p:nvPr/>
+        </p:nvSpPr>
+        <p:spPr>
+          <a:xfrm>
+            <a:off x="2003215" y="3654967"/>
+            <a:ext cx="369012" cy="230832"/>
+          </a:xfrm>
+          <a:prstGeom prst="rect">
+            <a:avLst/>
+          </a:prstGeom>
+          <a:noFill/>
+        </p:spPr>
+        <p:txBody>
+          <a:bodyPr wrap="none" rtlCol="0">
+            <a:spAutoFit/>
+          </a:bodyPr>
+          <a:lstStyle/>
+          <a:p>
+            <a:r>
+              <a:rPr lang="en-US" sz="900" dirty="0"/>
+              <a:t>URL</a:t>
+            </a:r>
+          </a:p>
+        </p:txBody>
+      </p:sp>
+      <p:sp>
+        <p:nvSpPr>
+          <p:cNvPr id="36" name="Rectangle 35">
+            <a:extLst>
+              <a:ext uri="{FF2B5EF4-FFF2-40B4-BE49-F238E27FC236}">
+                <a16:creationId xmlns:a16="http://schemas.microsoft.com/office/drawing/2014/main" id="{EF536020-9CEE-4CF9-BF8C-22D2FFB54BC7}"/>
+              </a:ext>
+            </a:extLst>
+          </p:cNvPr>
+          <p:cNvSpPr/>
+          <p:nvPr/>
+        </p:nvSpPr>
+        <p:spPr>
+          <a:xfrm>
+            <a:off x="2522555" y="3686416"/>
+            <a:ext cx="1244103" cy="197426"/>
+          </a:xfrm>
+          <a:prstGeom prst="rect">
+            <a:avLst/>
+          </a:prstGeom>
+          <a:solidFill>
+            <a:schemeClr val="bg1"/>
+          </a:solidFill>
+          <a:ln>
+            <a:solidFill>
+              <a:schemeClr val="tx1"/>
+            </a:solidFill>
+          </a:ln>
+        </p:spPr>
+        <p:style>
+          <a:lnRef idx="2">
+            <a:schemeClr val="accent1">
+              <a:shade val="50000"/>
+            </a:schemeClr>
+          </a:lnRef>
+          <a:fillRef idx="1">
+            <a:schemeClr val="accent1"/>
+          </a:fillRef>
+          <a:effectRef idx="0">
+            <a:schemeClr val="accent1"/>
+          </a:effectRef>
+          <a:fontRef idx="minor">
+            <a:schemeClr val="lt1"/>
+          </a:fontRef>
+        </p:style>
+        <p:txBody>
+          <a:bodyPr rtlCol="0" anchor="ctr"/>
+          <a:lstStyle/>
+          <a:p>
+            <a:pPr algn="ctr"/>
+            <a:endParaRPr lang="en-US"/>
+          </a:p>
+        </p:txBody>
+      </p:sp>
+      <p:sp>
+        <p:nvSpPr>
+          <p:cNvPr id="37" name="TextBox 36">
+            <a:extLst>
+              <a:ext uri="{FF2B5EF4-FFF2-40B4-BE49-F238E27FC236}">
+                <a16:creationId xmlns:a16="http://schemas.microsoft.com/office/drawing/2014/main" id="{24612D55-49A8-41CF-9609-85B8D821B5C5}"/>
+              </a:ext>
+            </a:extLst>
+          </p:cNvPr>
+          <p:cNvSpPr txBox="1"/>
+          <p:nvPr/>
+        </p:nvSpPr>
+        <p:spPr>
+          <a:xfrm>
+            <a:off x="2003215" y="3888572"/>
+            <a:ext cx="394660" cy="230832"/>
+          </a:xfrm>
+          <a:prstGeom prst="rect">
+            <a:avLst/>
+          </a:prstGeom>
+          <a:noFill/>
+        </p:spPr>
+        <p:txBody>
+          <a:bodyPr wrap="none" rtlCol="0">
+            <a:spAutoFit/>
+          </a:bodyPr>
+          <a:lstStyle/>
+          <a:p>
+            <a:r>
+              <a:rPr lang="en-US" sz="900" dirty="0"/>
+              <a:t>Tags</a:t>
+            </a:r>
+          </a:p>
+        </p:txBody>
+      </p:sp>
+      <p:sp>
+        <p:nvSpPr>
+          <p:cNvPr id="38" name="Rectangle 37">
+            <a:extLst>
+              <a:ext uri="{FF2B5EF4-FFF2-40B4-BE49-F238E27FC236}">
+                <a16:creationId xmlns:a16="http://schemas.microsoft.com/office/drawing/2014/main" id="{F78685B0-7747-429D-A745-0DD6F71E1F77}"/>
+              </a:ext>
+            </a:extLst>
+          </p:cNvPr>
+          <p:cNvSpPr/>
+          <p:nvPr/>
+        </p:nvSpPr>
+        <p:spPr>
+          <a:xfrm>
+            <a:off x="2522555" y="3940195"/>
+            <a:ext cx="1244103" cy="197426"/>
+          </a:xfrm>
+          <a:prstGeom prst="rect">
+            <a:avLst/>
+          </a:prstGeom>
+          <a:solidFill>
+            <a:schemeClr val="bg1"/>
+          </a:solidFill>
+          <a:ln>
+            <a:solidFill>
+              <a:schemeClr val="tx1"/>
+            </a:solidFill>
+          </a:ln>
+        </p:spPr>
+        <p:style>
+          <a:lnRef idx="2">
+            <a:schemeClr val="accent1">
+              <a:shade val="50000"/>
+            </a:schemeClr>
+          </a:lnRef>
+          <a:fillRef idx="1">
+            <a:schemeClr val="accent1"/>
+          </a:fillRef>
+          <a:effectRef idx="0">
+            <a:schemeClr val="accent1"/>
+          </a:effectRef>
+          <a:fontRef idx="minor">
+            <a:schemeClr val="lt1"/>
+          </a:fontRef>
+        </p:style>
+        <p:txBody>
+          <a:bodyPr rtlCol="0" anchor="ctr"/>
+          <a:lstStyle/>
+          <a:p>
+            <a:pPr algn="ctr"/>
+            <a:endParaRPr lang="en-US"/>
+          </a:p>
+        </p:txBody>
+      </p:sp>
+      <p:sp>
+        <p:nvSpPr>
+          <p:cNvPr id="39" name="TextBox 38">
+            <a:extLst>
+              <a:ext uri="{FF2B5EF4-FFF2-40B4-BE49-F238E27FC236}">
+                <a16:creationId xmlns:a16="http://schemas.microsoft.com/office/drawing/2014/main" id="{CA768BE4-6AAB-4924-A238-5CEADB5F9EC0}"/>
+              </a:ext>
+            </a:extLst>
+          </p:cNvPr>
+          <p:cNvSpPr txBox="1"/>
+          <p:nvPr/>
+        </p:nvSpPr>
+        <p:spPr>
+          <a:xfrm>
+            <a:off x="2003215" y="4122177"/>
+            <a:ext cx="460382" cy="230832"/>
+          </a:xfrm>
+          <a:prstGeom prst="rect">
+            <a:avLst/>
+          </a:prstGeom>
+          <a:noFill/>
+        </p:spPr>
+        <p:txBody>
+          <a:bodyPr wrap="none" rtlCol="0">
+            <a:spAutoFit/>
+          </a:bodyPr>
+          <a:lstStyle/>
+          <a:p>
+            <a:r>
+              <a:rPr lang="en-US" sz="900" dirty="0"/>
+              <a:t>Notes</a:t>
+            </a:r>
+          </a:p>
+        </p:txBody>
+      </p:sp>
+      <p:sp>
+        <p:nvSpPr>
+          <p:cNvPr id="40" name="Rectangle 39">
+            <a:extLst>
+              <a:ext uri="{FF2B5EF4-FFF2-40B4-BE49-F238E27FC236}">
+                <a16:creationId xmlns:a16="http://schemas.microsoft.com/office/drawing/2014/main" id="{C86E249F-35F5-4A09-AB6D-891940AF7133}"/>
+              </a:ext>
+            </a:extLst>
+          </p:cNvPr>
+          <p:cNvSpPr/>
+          <p:nvPr/>
+        </p:nvSpPr>
+        <p:spPr>
+          <a:xfrm>
+            <a:off x="2522555" y="4193974"/>
+            <a:ext cx="1244103" cy="197426"/>
+          </a:xfrm>
+          <a:prstGeom prst="rect">
+            <a:avLst/>
+          </a:prstGeom>
+          <a:solidFill>
+            <a:schemeClr val="bg1"/>
+          </a:solidFill>
+          <a:ln>
+            <a:solidFill>
+              <a:schemeClr val="tx1"/>
+            </a:solidFill>
+          </a:ln>
+        </p:spPr>
+        <p:style>
+          <a:lnRef idx="2">
+            <a:schemeClr val="accent1">
+              <a:shade val="50000"/>
+            </a:schemeClr>
+          </a:lnRef>
+          <a:fillRef idx="1">
+            <a:schemeClr val="accent1"/>
+          </a:fillRef>
+          <a:effectRef idx="0">
+            <a:schemeClr val="accent1"/>
+          </a:effectRef>
+          <a:fontRef idx="minor">
+            <a:schemeClr val="lt1"/>
+          </a:fontRef>
+        </p:style>
+        <p:txBody>
+          <a:bodyPr rtlCol="0" anchor="ctr"/>
+          <a:lstStyle/>
+          <a:p>
+            <a:pPr algn="ctr"/>
+            <a:endParaRPr lang="en-US"/>
+          </a:p>
+        </p:txBody>
+      </p:sp>
+      <p:sp>
+        <p:nvSpPr>
+          <p:cNvPr id="41" name="TextBox 40">
+            <a:extLst>
+              <a:ext uri="{FF2B5EF4-FFF2-40B4-BE49-F238E27FC236}">
+                <a16:creationId xmlns:a16="http://schemas.microsoft.com/office/drawing/2014/main" id="{9E7E7AA0-E0E4-4AA4-B686-1E37F93026A2}"/>
+              </a:ext>
+            </a:extLst>
+          </p:cNvPr>
+          <p:cNvSpPr txBox="1"/>
+          <p:nvPr/>
+        </p:nvSpPr>
+        <p:spPr>
+          <a:xfrm>
+            <a:off x="2003215" y="4355782"/>
+            <a:ext cx="643044" cy="369332"/>
+          </a:xfrm>
+          <a:prstGeom prst="rect">
+            <a:avLst/>
+          </a:prstGeom>
+          <a:noFill/>
+        </p:spPr>
+        <p:txBody>
+          <a:bodyPr wrap="square" rtlCol="0">
+            <a:spAutoFit/>
+          </a:bodyPr>
+          <a:lstStyle/>
+          <a:p>
+            <a:r>
+              <a:rPr lang="en-US" sz="900" dirty="0"/>
+              <a:t>Image URL</a:t>
+            </a:r>
+          </a:p>
+        </p:txBody>
+      </p:sp>
+      <p:sp>
+        <p:nvSpPr>
+          <p:cNvPr id="42" name="Rectangle 41">
+            <a:extLst>
+              <a:ext uri="{FF2B5EF4-FFF2-40B4-BE49-F238E27FC236}">
+                <a16:creationId xmlns:a16="http://schemas.microsoft.com/office/drawing/2014/main" id="{E09B5806-8B84-499B-9DED-8C716FF3E64A}"/>
+              </a:ext>
+            </a:extLst>
+          </p:cNvPr>
+          <p:cNvSpPr/>
+          <p:nvPr/>
+        </p:nvSpPr>
+        <p:spPr>
+          <a:xfrm>
+            <a:off x="2522555" y="4447752"/>
+            <a:ext cx="1244103" cy="197426"/>
+          </a:xfrm>
+          <a:prstGeom prst="rect">
+            <a:avLst/>
+          </a:prstGeom>
+          <a:solidFill>
+            <a:schemeClr val="bg1"/>
+          </a:solidFill>
+          <a:ln>
+            <a:solidFill>
+              <a:schemeClr val="tx1"/>
+            </a:solidFill>
+          </a:ln>
+        </p:spPr>
+        <p:style>
+          <a:lnRef idx="2">
+            <a:schemeClr val="accent1">
+              <a:shade val="50000"/>
+            </a:schemeClr>
+          </a:lnRef>
+          <a:fillRef idx="1">
+            <a:schemeClr val="accent1"/>
+          </a:fillRef>
+          <a:effectRef idx="0">
+            <a:schemeClr val="accent1"/>
+          </a:effectRef>
+          <a:fontRef idx="minor">
+            <a:schemeClr val="lt1"/>
+          </a:fontRef>
+        </p:style>
+        <p:txBody>
+          <a:bodyPr rtlCol="0" anchor="ctr"/>
+          <a:lstStyle/>
+          <a:p>
+            <a:pPr algn="ctr"/>
+            <a:endParaRPr lang="en-US"/>
+          </a:p>
+        </p:txBody>
+      </p:sp>
+      <p:sp>
+        <p:nvSpPr>
+          <p:cNvPr id="11" name="Rectangle 10">
+            <a:extLst>
+              <a:ext uri="{FF2B5EF4-FFF2-40B4-BE49-F238E27FC236}">
+                <a16:creationId xmlns:a16="http://schemas.microsoft.com/office/drawing/2014/main" id="{9BEFC692-E455-4940-A3C9-1FF453FCDDB1}"/>
+              </a:ext>
+            </a:extLst>
+          </p:cNvPr>
+          <p:cNvSpPr/>
+          <p:nvPr/>
+        </p:nvSpPr>
+        <p:spPr>
+          <a:xfrm>
+            <a:off x="2517339" y="4959438"/>
+            <a:ext cx="567119" cy="182592"/>
+          </a:xfrm>
+          <a:prstGeom prst="rect">
+            <a:avLst/>
+          </a:prstGeom>
+          <a:solidFill>
+            <a:schemeClr val="bg2">
+              <a:lumMod val="90000"/>
+            </a:schemeClr>
+          </a:solidFill>
+          <a:ln>
+            <a:solidFill>
+              <a:schemeClr val="tx1"/>
+            </a:solidFill>
+          </a:ln>
+        </p:spPr>
+        <p:style>
+          <a:lnRef idx="2">
+            <a:schemeClr val="accent1">
+              <a:shade val="50000"/>
+            </a:schemeClr>
+          </a:lnRef>
+          <a:fillRef idx="1">
+            <a:schemeClr val="accent1"/>
+          </a:fillRef>
+          <a:effectRef idx="0">
+            <a:schemeClr val="accent1"/>
+          </a:effectRef>
+          <a:fontRef idx="minor">
+            <a:schemeClr val="lt1"/>
+          </a:fontRef>
+        </p:style>
+        <p:txBody>
+          <a:bodyPr rtlCol="0" anchor="ctr"/>
+          <a:lstStyle/>
+          <a:p>
+            <a:pPr algn="ctr"/>
+            <a:r>
+              <a:rPr lang="en-US" sz="1050" dirty="0">
+                <a:solidFill>
+                  <a:schemeClr val="tx1"/>
+                </a:solidFill>
+              </a:rPr>
+              <a:t>save</a:t>
+            </a:r>
+          </a:p>
+        </p:txBody>
+      </p:sp>
+      <p:sp>
+        <p:nvSpPr>
+          <p:cNvPr id="43" name="Rectangle 42">
+            <a:extLst>
+              <a:ext uri="{FF2B5EF4-FFF2-40B4-BE49-F238E27FC236}">
+                <a16:creationId xmlns:a16="http://schemas.microsoft.com/office/drawing/2014/main" id="{FBE3E050-F154-4559-A9B2-236A007F2AD8}"/>
+              </a:ext>
+            </a:extLst>
+          </p:cNvPr>
+          <p:cNvSpPr/>
+          <p:nvPr/>
+        </p:nvSpPr>
+        <p:spPr>
+          <a:xfrm>
+            <a:off x="3199539" y="4962702"/>
+            <a:ext cx="567119" cy="182592"/>
+          </a:xfrm>
+          <a:prstGeom prst="rect">
+            <a:avLst/>
+          </a:prstGeom>
+          <a:solidFill>
+            <a:schemeClr val="bg2">
+              <a:lumMod val="90000"/>
+            </a:schemeClr>
+          </a:solidFill>
+          <a:ln>
+            <a:solidFill>
+              <a:schemeClr val="tx1"/>
+            </a:solidFill>
+          </a:ln>
+        </p:spPr>
+        <p:style>
+          <a:lnRef idx="2">
+            <a:schemeClr val="accent1">
+              <a:shade val="50000"/>
+            </a:schemeClr>
+          </a:lnRef>
+          <a:fillRef idx="1">
+            <a:schemeClr val="accent1"/>
+          </a:fillRef>
+          <a:effectRef idx="0">
+            <a:schemeClr val="accent1"/>
+          </a:effectRef>
+          <a:fontRef idx="minor">
+            <a:schemeClr val="lt1"/>
+          </a:fontRef>
+        </p:style>
+        <p:txBody>
+          <a:bodyPr rtlCol="0" anchor="ctr"/>
+          <a:lstStyle/>
+          <a:p>
+            <a:pPr algn="ctr"/>
+            <a:r>
+              <a:rPr lang="en-US" sz="1050" dirty="0">
+                <a:solidFill>
+                  <a:schemeClr val="tx1"/>
+                </a:solidFill>
+              </a:rPr>
+              <a:t>cancel</a:t>
+            </a:r>
+          </a:p>
+        </p:txBody>
+      </p:sp>
+    </p:spTree>
+    <p:extLst>
+      <p:ext uri="{BB962C8B-B14F-4D97-AF65-F5344CB8AC3E}">
+        <p14:creationId xmlns:p14="http://schemas.microsoft.com/office/powerpoint/2010/main" val="3412314983"/>
+      </p:ext>
+    </p:extLst>
+  </p:cSld>
+  <p:clrMapOvr>
+    <a:masterClrMapping/>
+  </p:clrMapOvr>
+</p:sld>
+</file>
+
+<file path=ppt/slides/slide5.xml><?xml version="1.0" encoding="utf-8"?>
+<p:sld xmlns:a="http://schemas.openxmlformats.org/drawingml/2006/main" xmlns:r="http://schemas.openxmlformats.org/officeDocument/2006/relationships" xmlns:p="http://schemas.openxmlformats.org/presentationml/2006/main">
+  <p:cSld>
+    <p:spTree>
+      <p:nvGrpSpPr>
+        <p:cNvPr id="1" name=""/>
+        <p:cNvGrpSpPr/>
+        <p:nvPr/>
+      </p:nvGrpSpPr>
+      <p:grpSpPr>
+        <a:xfrm>
+          <a:off x="0" y="0"/>
+          <a:ext cx="0" cy="0"/>
+          <a:chOff x="0" y="0"/>
+          <a:chExt cx="0" cy="0"/>
+        </a:xfrm>
+      </p:grpSpPr>
+      <p:sp>
+        <p:nvSpPr>
+          <p:cNvPr id="2" name="Rectangle 1">
+            <a:extLst>
+              <a:ext uri="{FF2B5EF4-FFF2-40B4-BE49-F238E27FC236}">
+                <a16:creationId xmlns:a16="http://schemas.microsoft.com/office/drawing/2014/main" id="{7FF686F5-6F69-4B1F-9072-4D9B10A9893D}"/>
+              </a:ext>
+            </a:extLst>
+          </p:cNvPr>
+          <p:cNvSpPr/>
+          <p:nvPr/>
+        </p:nvSpPr>
+        <p:spPr>
+          <a:xfrm>
+            <a:off x="707471" y="1280067"/>
+            <a:ext cx="1138107" cy="5405959"/>
+          </a:xfrm>
+          <a:prstGeom prst="rect">
+            <a:avLst/>
+          </a:prstGeom>
+          <a:solidFill>
+            <a:schemeClr val="tx1">
+              <a:lumMod val="75000"/>
+              <a:lumOff val="25000"/>
+            </a:schemeClr>
+          </a:solidFill>
+        </p:spPr>
+        <p:txBody>
+          <a:bodyPr wrap="square">
+            <a:noAutofit/>
+          </a:bodyPr>
+          <a:lstStyle/>
+          <a:p>
+            <a:r>
+              <a:rPr lang="en-US" sz="1000" dirty="0">
+                <a:solidFill>
+                  <a:schemeClr val="bg1"/>
+                </a:solidFill>
+              </a:rPr>
+              <a:t>3dmodels</a:t>
+            </a:r>
+          </a:p>
+          <a:p>
+            <a:r>
+              <a:rPr lang="en-US" sz="1000" dirty="0">
+                <a:solidFill>
+                  <a:schemeClr val="bg1"/>
+                </a:solidFill>
+              </a:rPr>
+              <a:t>active</a:t>
+            </a:r>
+          </a:p>
+          <a:p>
+            <a:r>
+              <a:rPr lang="en-US" sz="1000" dirty="0">
+                <a:solidFill>
+                  <a:schemeClr val="bg1"/>
+                </a:solidFill>
+              </a:rPr>
+              <a:t>activity</a:t>
+            </a:r>
+          </a:p>
+          <a:p>
+            <a:r>
+              <a:rPr lang="en-US" sz="1000" dirty="0" err="1">
+                <a:solidFill>
+                  <a:schemeClr val="bg1"/>
+                </a:solidFill>
+              </a:rPr>
+              <a:t>api</a:t>
+            </a:r>
+            <a:endParaRPr lang="en-US" sz="1000" dirty="0">
+              <a:solidFill>
+                <a:schemeClr val="bg1"/>
+              </a:solidFill>
+            </a:endParaRPr>
+          </a:p>
+          <a:p>
+            <a:r>
+              <a:rPr lang="en-US" sz="1000" dirty="0">
+                <a:solidFill>
+                  <a:schemeClr val="bg1"/>
+                </a:solidFill>
+              </a:rPr>
+              <a:t>architecture  </a:t>
+            </a:r>
+          </a:p>
+          <a:p>
+            <a:r>
+              <a:rPr lang="en-US" sz="1000" dirty="0">
+                <a:solidFill>
+                  <a:schemeClr val="bg1"/>
+                </a:solidFill>
+              </a:rPr>
+              <a:t>art  </a:t>
+            </a:r>
+          </a:p>
+          <a:p>
+            <a:r>
+              <a:rPr lang="en-US" sz="1000" dirty="0">
+                <a:solidFill>
+                  <a:schemeClr val="bg1"/>
+                </a:solidFill>
+              </a:rPr>
+              <a:t>artists  </a:t>
+            </a:r>
+          </a:p>
+          <a:p>
+            <a:r>
+              <a:rPr lang="en-US" sz="1000" dirty="0">
+                <a:solidFill>
+                  <a:schemeClr val="bg1"/>
+                </a:solidFill>
+              </a:rPr>
+              <a:t>audio  </a:t>
+            </a:r>
+          </a:p>
+          <a:p>
+            <a:r>
+              <a:rPr lang="en-US" sz="1000" dirty="0" err="1">
+                <a:solidFill>
+                  <a:schemeClr val="bg1"/>
+                </a:solidFill>
+              </a:rPr>
+              <a:t>aws</a:t>
+            </a:r>
+            <a:r>
+              <a:rPr lang="en-US" sz="1000" dirty="0">
+                <a:solidFill>
+                  <a:schemeClr val="bg1"/>
+                </a:solidFill>
+              </a:rPr>
+              <a:t>  </a:t>
+            </a:r>
+          </a:p>
+          <a:p>
+            <a:r>
+              <a:rPr lang="en-US" sz="1000" dirty="0">
+                <a:solidFill>
+                  <a:schemeClr val="accent1">
+                    <a:lumMod val="40000"/>
+                    <a:lumOff val="60000"/>
+                  </a:schemeClr>
+                </a:solidFill>
+              </a:rPr>
+              <a:t>azure</a:t>
+            </a:r>
+            <a:r>
+              <a:rPr lang="en-US" sz="1000" dirty="0">
+                <a:solidFill>
+                  <a:schemeClr val="bg1"/>
+                </a:solidFill>
+              </a:rPr>
+              <a:t>  </a:t>
+            </a:r>
+          </a:p>
+          <a:p>
+            <a:r>
+              <a:rPr lang="en-US" sz="1000" dirty="0" err="1">
+                <a:solidFill>
+                  <a:schemeClr val="bg1"/>
+                </a:solidFill>
+              </a:rPr>
+              <a:t>battlecards</a:t>
+            </a:r>
+            <a:r>
+              <a:rPr lang="en-US" sz="1000" dirty="0">
+                <a:solidFill>
+                  <a:schemeClr val="bg1"/>
+                </a:solidFill>
+              </a:rPr>
+              <a:t>  </a:t>
+            </a:r>
+          </a:p>
+          <a:p>
+            <a:r>
+              <a:rPr lang="en-US" sz="1000" dirty="0">
+                <a:solidFill>
+                  <a:schemeClr val="bg1"/>
+                </a:solidFill>
+              </a:rPr>
+              <a:t>bits  </a:t>
+            </a:r>
+          </a:p>
+          <a:p>
+            <a:r>
+              <a:rPr lang="en-US" sz="1000" dirty="0">
+                <a:solidFill>
+                  <a:schemeClr val="bg1"/>
+                </a:solidFill>
+              </a:rPr>
+              <a:t>blog  </a:t>
+            </a:r>
+          </a:p>
+          <a:p>
+            <a:r>
+              <a:rPr lang="en-US" sz="1000" dirty="0">
+                <a:solidFill>
+                  <a:schemeClr val="bg1"/>
+                </a:solidFill>
+              </a:rPr>
+              <a:t>bookmarks  </a:t>
+            </a:r>
+          </a:p>
+          <a:p>
+            <a:r>
+              <a:rPr lang="en-US" sz="1000" dirty="0" err="1">
+                <a:solidFill>
+                  <a:schemeClr val="bg1"/>
+                </a:solidFill>
+              </a:rPr>
+              <a:t>boston</a:t>
+            </a:r>
+            <a:r>
+              <a:rPr lang="en-US" sz="1000" dirty="0">
+                <a:solidFill>
+                  <a:schemeClr val="bg1"/>
+                </a:solidFill>
+              </a:rPr>
+              <a:t>  </a:t>
+            </a:r>
+          </a:p>
+          <a:p>
+            <a:r>
+              <a:rPr lang="en-US" sz="1000" dirty="0">
+                <a:solidFill>
+                  <a:schemeClr val="bg1"/>
+                </a:solidFill>
+              </a:rPr>
+              <a:t>calculator  </a:t>
+            </a:r>
+          </a:p>
+          <a:p>
+            <a:r>
+              <a:rPr lang="en-US" sz="1000" dirty="0">
+                <a:solidFill>
+                  <a:schemeClr val="bg1"/>
+                </a:solidFill>
+              </a:rPr>
+              <a:t>cards  </a:t>
+            </a:r>
+          </a:p>
+          <a:p>
+            <a:r>
+              <a:rPr lang="en-US" sz="1000" dirty="0">
+                <a:solidFill>
+                  <a:schemeClr val="bg1"/>
+                </a:solidFill>
+              </a:rPr>
+              <a:t>circuits  </a:t>
+            </a:r>
+          </a:p>
+          <a:p>
+            <a:r>
+              <a:rPr lang="en-US" sz="1000" dirty="0">
+                <a:solidFill>
+                  <a:schemeClr val="accent2">
+                    <a:lumMod val="60000"/>
+                    <a:lumOff val="40000"/>
+                  </a:schemeClr>
+                </a:solidFill>
+              </a:rPr>
+              <a:t>code</a:t>
+            </a:r>
+            <a:r>
+              <a:rPr lang="en-US" sz="1000" dirty="0">
+                <a:solidFill>
+                  <a:schemeClr val="bg1"/>
+                </a:solidFill>
+              </a:rPr>
+              <a:t> </a:t>
+            </a:r>
+          </a:p>
+          <a:p>
+            <a:r>
+              <a:rPr lang="en-US" sz="1000" dirty="0">
+                <a:solidFill>
+                  <a:schemeClr val="bg1"/>
+                </a:solidFill>
+              </a:rPr>
+              <a:t>college  </a:t>
+            </a:r>
+          </a:p>
+          <a:p>
+            <a:r>
+              <a:rPr lang="en-US" sz="1000" dirty="0">
+                <a:solidFill>
+                  <a:schemeClr val="bg1"/>
+                </a:solidFill>
+              </a:rPr>
+              <a:t>color  </a:t>
+            </a:r>
+          </a:p>
+          <a:p>
+            <a:r>
+              <a:rPr lang="en-US" sz="1000" dirty="0">
+                <a:solidFill>
+                  <a:schemeClr val="bg1"/>
+                </a:solidFill>
+              </a:rPr>
+              <a:t>comics  </a:t>
+            </a:r>
+          </a:p>
+          <a:p>
+            <a:r>
+              <a:rPr lang="en-US" sz="1000" dirty="0">
+                <a:solidFill>
+                  <a:schemeClr val="bg1"/>
+                </a:solidFill>
+              </a:rPr>
+              <a:t>compete  </a:t>
+            </a:r>
+          </a:p>
+          <a:p>
+            <a:r>
+              <a:rPr lang="en-US" sz="1000" dirty="0">
+                <a:solidFill>
+                  <a:schemeClr val="bg1"/>
+                </a:solidFill>
+              </a:rPr>
+              <a:t>convert </a:t>
+            </a:r>
+          </a:p>
+          <a:p>
+            <a:r>
+              <a:rPr lang="en-US" sz="1000" dirty="0">
+                <a:solidFill>
+                  <a:schemeClr val="bg1"/>
+                </a:solidFill>
+              </a:rPr>
+              <a:t>corpnet  </a:t>
+            </a:r>
+          </a:p>
+          <a:p>
+            <a:r>
+              <a:rPr lang="en-US" sz="1000" dirty="0" err="1">
+                <a:solidFill>
+                  <a:schemeClr val="bg1"/>
+                </a:solidFill>
+              </a:rPr>
+              <a:t>css</a:t>
+            </a:r>
+            <a:r>
+              <a:rPr lang="en-US" sz="1000" dirty="0">
+                <a:solidFill>
+                  <a:schemeClr val="bg1"/>
+                </a:solidFill>
+              </a:rPr>
+              <a:t>  </a:t>
+            </a:r>
+          </a:p>
+          <a:p>
+            <a:r>
+              <a:rPr lang="en-US" sz="1000" dirty="0">
+                <a:solidFill>
+                  <a:schemeClr val="bg1"/>
+                </a:solidFill>
+              </a:rPr>
+              <a:t>demo  </a:t>
+            </a:r>
+          </a:p>
+          <a:p>
+            <a:r>
+              <a:rPr lang="en-US" sz="1000" dirty="0">
+                <a:solidFill>
+                  <a:schemeClr val="bg1"/>
+                </a:solidFill>
+              </a:rPr>
+              <a:t>design  </a:t>
+            </a:r>
+          </a:p>
+          <a:p>
+            <a:r>
+              <a:rPr lang="en-US" sz="1000" dirty="0" err="1">
+                <a:solidFill>
+                  <a:schemeClr val="accent6">
+                    <a:lumMod val="60000"/>
+                    <a:lumOff val="40000"/>
+                  </a:schemeClr>
+                </a:solidFill>
+              </a:rPr>
+              <a:t>dmscreen</a:t>
+            </a:r>
+            <a:r>
+              <a:rPr lang="en-US" sz="1000" dirty="0">
+                <a:solidFill>
+                  <a:schemeClr val="bg1"/>
+                </a:solidFill>
+              </a:rPr>
+              <a:t>  </a:t>
+            </a:r>
+          </a:p>
+          <a:p>
+            <a:r>
+              <a:rPr lang="en-US" sz="1000" dirty="0" err="1">
+                <a:solidFill>
+                  <a:schemeClr val="bg1"/>
+                </a:solidFill>
+              </a:rPr>
+              <a:t>dnd</a:t>
+            </a:r>
+            <a:r>
+              <a:rPr lang="en-US" sz="1000" dirty="0">
+                <a:solidFill>
+                  <a:schemeClr val="bg1"/>
+                </a:solidFill>
+              </a:rPr>
+              <a:t> </a:t>
+            </a:r>
+          </a:p>
+          <a:p>
+            <a:r>
+              <a:rPr lang="en-US" sz="1000" dirty="0" err="1">
+                <a:solidFill>
+                  <a:schemeClr val="bg1"/>
+                </a:solidFill>
+              </a:rPr>
+              <a:t>ebook</a:t>
+            </a:r>
+            <a:r>
+              <a:rPr lang="en-US" sz="1000" dirty="0">
+                <a:solidFill>
+                  <a:schemeClr val="bg1"/>
+                </a:solidFill>
+              </a:rPr>
+              <a:t>  </a:t>
+            </a:r>
+          </a:p>
+          <a:p>
+            <a:r>
+              <a:rPr lang="en-US" sz="1000" dirty="0" err="1">
+                <a:solidFill>
+                  <a:schemeClr val="bg1"/>
+                </a:solidFill>
+              </a:rPr>
+              <a:t>ebooks</a:t>
+            </a:r>
+            <a:r>
+              <a:rPr lang="en-US" sz="1000" dirty="0">
+                <a:solidFill>
+                  <a:schemeClr val="bg1"/>
+                </a:solidFill>
+              </a:rPr>
+              <a:t>  </a:t>
+            </a:r>
+          </a:p>
+          <a:p>
+            <a:r>
+              <a:rPr lang="en-US" sz="1000" dirty="0">
+                <a:solidFill>
+                  <a:schemeClr val="bg1"/>
+                </a:solidFill>
+              </a:rPr>
+              <a:t>elite </a:t>
+            </a:r>
+          </a:p>
+          <a:p>
+            <a:r>
+              <a:rPr lang="en-US" sz="1000" dirty="0">
+                <a:solidFill>
+                  <a:schemeClr val="bg1"/>
+                </a:solidFill>
+              </a:rPr>
+              <a:t>emoji  </a:t>
+            </a:r>
+          </a:p>
+          <a:p>
+            <a:r>
+              <a:rPr lang="en-US" sz="1000" dirty="0">
+                <a:solidFill>
+                  <a:schemeClr val="bg1"/>
+                </a:solidFill>
+              </a:rPr>
+              <a:t>energy  </a:t>
+            </a:r>
+          </a:p>
+          <a:p>
+            <a:r>
+              <a:rPr lang="en-US" sz="1000" dirty="0" err="1">
+                <a:solidFill>
+                  <a:schemeClr val="bg1"/>
+                </a:solidFill>
+              </a:rPr>
+              <a:t>faq</a:t>
+            </a:r>
+            <a:r>
+              <a:rPr lang="en-US" sz="1000" dirty="0">
+                <a:solidFill>
+                  <a:schemeClr val="bg1"/>
+                </a:solidFill>
+              </a:rPr>
+              <a:t>  </a:t>
+            </a:r>
+          </a:p>
+          <a:p>
+            <a:r>
+              <a:rPr lang="en-US" sz="1000" dirty="0">
+                <a:solidFill>
+                  <a:schemeClr val="bg1"/>
+                </a:solidFill>
+              </a:rPr>
+              <a:t>finance</a:t>
+            </a:r>
+          </a:p>
+          <a:p>
+            <a:r>
+              <a:rPr lang="en-US" sz="1000" dirty="0">
+                <a:solidFill>
+                  <a:schemeClr val="bg1"/>
+                </a:solidFill>
+              </a:rPr>
+              <a:t>fonts</a:t>
+            </a:r>
+          </a:p>
+        </p:txBody>
+      </p:sp>
+      <p:pic>
+        <p:nvPicPr>
+          <p:cNvPr id="4" name="Picture 3" descr="Screen Clipping">
+            <a:extLst>
+              <a:ext uri="{FF2B5EF4-FFF2-40B4-BE49-F238E27FC236}">
+                <a16:creationId xmlns:a16="http://schemas.microsoft.com/office/drawing/2014/main" id="{9AF29DC9-CF24-4B74-93D7-FA98C431237A}"/>
+              </a:ext>
+            </a:extLst>
+          </p:cNvPr>
+          <p:cNvPicPr>
+            <a:picLocks noChangeAspect="1"/>
+          </p:cNvPicPr>
+          <p:nvPr/>
+        </p:nvPicPr>
+        <p:blipFill>
+          <a:blip r:embed="rId2">
+            <a:extLst>
+              <a:ext uri="{28A0092B-C50C-407E-A947-70E740481C1C}">
+                <a14:useLocalDpi xmlns:a14="http://schemas.microsoft.com/office/drawing/2010/main" val="0"/>
+              </a:ext>
+            </a:extLst>
+          </a:blip>
+          <a:stretch>
+            <a:fillRect/>
+          </a:stretch>
+        </p:blipFill>
+        <p:spPr>
+          <a:xfrm>
+            <a:off x="1845578" y="1292543"/>
+            <a:ext cx="6182686" cy="801939"/>
+          </a:xfrm>
+          <a:prstGeom prst="rect">
+            <a:avLst/>
+          </a:prstGeom>
+        </p:spPr>
+      </p:pic>
+      <p:sp>
+        <p:nvSpPr>
+          <p:cNvPr id="5" name="TextBox 4">
+            <a:extLst>
+              <a:ext uri="{FF2B5EF4-FFF2-40B4-BE49-F238E27FC236}">
+                <a16:creationId xmlns:a16="http://schemas.microsoft.com/office/drawing/2014/main" id="{EEDEC38A-C739-4FF6-86B9-441AF66DCE11}"/>
+              </a:ext>
+            </a:extLst>
+          </p:cNvPr>
+          <p:cNvSpPr txBox="1"/>
+          <p:nvPr/>
+        </p:nvSpPr>
+        <p:spPr>
+          <a:xfrm>
+            <a:off x="1845578" y="910735"/>
+            <a:ext cx="6182686" cy="369332"/>
+          </a:xfrm>
+          <a:prstGeom prst="rect">
+            <a:avLst/>
+          </a:prstGeom>
+          <a:noFill/>
+        </p:spPr>
+        <p:txBody>
+          <a:bodyPr wrap="square" rtlCol="0" anchor="ctr">
+            <a:spAutoFit/>
+          </a:bodyPr>
+          <a:lstStyle/>
+          <a:p>
+            <a:pPr algn="r"/>
+            <a:r>
+              <a:rPr lang="en-US" b="1" dirty="0"/>
               <a:t>top promoted</a:t>
             </a:r>
           </a:p>
@@ -3084,7 +7064,7 @@
 </p:sld>
 </file>
 
-<file path=ppt/slides/slide4.xml><?xml version="1.0" encoding="utf-8"?>
+<file path=ppt/slides/slide6.xml><?xml version="1.0" encoding="utf-8"?>
 <p:sld xmlns:a="http://schemas.openxmlformats.org/drawingml/2006/main" xmlns:r="http://schemas.openxmlformats.org/officeDocument/2006/relationships" xmlns:p="http://schemas.openxmlformats.org/presentationml/2006/main">
   <p:cSld>
     <p:spTree>

</xml_diff>